<commit_message>
feat(8_conv_layer_forward): update ppt and code
</commit_message>
<xml_diff>
--- a/lessons/8_conv_layer_forward/ppt/卷积神经网络与卷积层的前向传播推导.pptx
+++ b/lessons/8_conv_layer_forward/ppt/卷积神经网络与卷积层的前向传播推导.pptx
@@ -5,10 +5,10 @@
     <p:sldMasterId id="2147483648" r:id="rId1"/>
   </p:sldMasterIdLst>
   <p:notesMasterIdLst>
-    <p:notesMasterId r:id="rId40"/>
+    <p:notesMasterId r:id="rId38"/>
   </p:notesMasterIdLst>
   <p:handoutMasterIdLst>
-    <p:handoutMasterId r:id="rId41"/>
+    <p:handoutMasterId r:id="rId39"/>
   </p:handoutMasterIdLst>
   <p:sldIdLst>
     <p:sldId id="307" r:id="rId2"/>
@@ -35,25 +35,23 @@
     <p:sldId id="1111" r:id="rId23"/>
     <p:sldId id="1118" r:id="rId24"/>
     <p:sldId id="1113" r:id="rId25"/>
-    <p:sldId id="1114" r:id="rId26"/>
-    <p:sldId id="1115" r:id="rId27"/>
-    <p:sldId id="1116" r:id="rId28"/>
-    <p:sldId id="1117" r:id="rId29"/>
-    <p:sldId id="1083" r:id="rId30"/>
-    <p:sldId id="1091" r:id="rId31"/>
-    <p:sldId id="1099" r:id="rId32"/>
-    <p:sldId id="537" r:id="rId33"/>
-    <p:sldId id="536" r:id="rId34"/>
-    <p:sldId id="1014" r:id="rId35"/>
-    <p:sldId id="1013" r:id="rId36"/>
-    <p:sldId id="997" r:id="rId37"/>
-    <p:sldId id="998" r:id="rId38"/>
-    <p:sldId id="653" r:id="rId39"/>
+    <p:sldId id="1119" r:id="rId26"/>
+    <p:sldId id="1114" r:id="rId27"/>
+    <p:sldId id="1117" r:id="rId28"/>
+    <p:sldId id="1083" r:id="rId29"/>
+    <p:sldId id="1091" r:id="rId30"/>
+    <p:sldId id="537" r:id="rId31"/>
+    <p:sldId id="536" r:id="rId32"/>
+    <p:sldId id="1014" r:id="rId33"/>
+    <p:sldId id="1013" r:id="rId34"/>
+    <p:sldId id="997" r:id="rId35"/>
+    <p:sldId id="998" r:id="rId36"/>
+    <p:sldId id="653" r:id="rId37"/>
   </p:sldIdLst>
   <p:sldSz cx="12192000" cy="6858000"/>
   <p:notesSz cx="6858000" cy="9144000"/>
   <p:custDataLst>
-    <p:tags r:id="rId42"/>
+    <p:tags r:id="rId40"/>
   </p:custDataLst>
   <p:defaultTextStyle>
     <a:defPPr>
@@ -12575,20 +12573,6 @@
             <a:endParaRPr lang="en-US" altLang="zh-CN" dirty="0"/>
           </a:p>
           <a:p>
-            <a:pPr marL="285750" indent="-285750">
-              <a:buFont typeface="Arial" panose="020B0604020202020204" pitchFamily="34" charset="0"/>
-              <a:buChar char="•"/>
-            </a:pPr>
-            <a:r>
-              <a:rPr lang="zh-CN" altLang="en-US" dirty="0"/>
-              <a:t>自学、互学、展学</a:t>
-            </a:r>
-          </a:p>
-          <a:p>
-            <a:pPr marL="285750" indent="-285750">
-              <a:buFont typeface="Arial" panose="020B0604020202020204" pitchFamily="34" charset="0"/>
-              <a:buChar char="•"/>
-            </a:pPr>
             <a:endParaRPr lang="zh-CN" altLang="en-US" dirty="0"/>
           </a:p>
           <a:p>
@@ -12756,6 +12740,175 @@
   <p:clrMapOvr>
     <a:masterClrMapping/>
   </p:clrMapOvr>
+  <p:timing>
+    <p:tnLst>
+      <p:par>
+        <p:cTn id="1" dur="indefinite" restart="never" nodeType="tmRoot">
+          <p:childTnLst>
+            <p:seq concurrent="1" nextAc="seek">
+              <p:cTn id="2" dur="indefinite" nodeType="mainSeq">
+                <p:childTnLst>
+                  <p:par>
+                    <p:cTn id="3" fill="hold">
+                      <p:stCondLst>
+                        <p:cond delay="indefinite"/>
+                      </p:stCondLst>
+                      <p:childTnLst>
+                        <p:par>
+                          <p:cTn id="4" fill="hold">
+                            <p:stCondLst>
+                              <p:cond delay="0"/>
+                            </p:stCondLst>
+                            <p:childTnLst>
+                              <p:par>
+                                <p:cTn id="5" presetID="1" presetClass="entr" presetSubtype="0" fill="hold" nodeType="clickEffect">
+                                  <p:stCondLst>
+                                    <p:cond delay="0"/>
+                                  </p:stCondLst>
+                                  <p:childTnLst>
+                                    <p:set>
+                                      <p:cBhvr>
+                                        <p:cTn id="6" dur="1" fill="hold">
+                                          <p:stCondLst>
+                                            <p:cond delay="0"/>
+                                          </p:stCondLst>
+                                        </p:cTn>
+                                        <p:tgtEl>
+                                          <p:spTgt spid="6">
+                                            <p:txEl>
+                                              <p:pRg st="0" end="0"/>
+                                            </p:txEl>
+                                          </p:spTgt>
+                                        </p:tgtEl>
+                                        <p:attrNameLst>
+                                          <p:attrName>style.visibility</p:attrName>
+                                        </p:attrNameLst>
+                                      </p:cBhvr>
+                                      <p:to>
+                                        <p:strVal val="visible"/>
+                                      </p:to>
+                                    </p:set>
+                                  </p:childTnLst>
+                                </p:cTn>
+                              </p:par>
+                            </p:childTnLst>
+                          </p:cTn>
+                        </p:par>
+                      </p:childTnLst>
+                    </p:cTn>
+                  </p:par>
+                  <p:par>
+                    <p:cTn id="7" fill="hold">
+                      <p:stCondLst>
+                        <p:cond delay="indefinite"/>
+                      </p:stCondLst>
+                      <p:childTnLst>
+                        <p:par>
+                          <p:cTn id="8" fill="hold">
+                            <p:stCondLst>
+                              <p:cond delay="0"/>
+                            </p:stCondLst>
+                            <p:childTnLst>
+                              <p:par>
+                                <p:cTn id="9" presetID="1" presetClass="entr" presetSubtype="0" fill="hold" nodeType="clickEffect">
+                                  <p:stCondLst>
+                                    <p:cond delay="0"/>
+                                  </p:stCondLst>
+                                  <p:childTnLst>
+                                    <p:set>
+                                      <p:cBhvr>
+                                        <p:cTn id="10" dur="1" fill="hold">
+                                          <p:stCondLst>
+                                            <p:cond delay="0"/>
+                                          </p:stCondLst>
+                                        </p:cTn>
+                                        <p:tgtEl>
+                                          <p:spTgt spid="6146"/>
+                                        </p:tgtEl>
+                                        <p:attrNameLst>
+                                          <p:attrName>style.visibility</p:attrName>
+                                        </p:attrNameLst>
+                                      </p:cBhvr>
+                                      <p:to>
+                                        <p:strVal val="visible"/>
+                                      </p:to>
+                                    </p:set>
+                                  </p:childTnLst>
+                                </p:cTn>
+                              </p:par>
+                            </p:childTnLst>
+                          </p:cTn>
+                        </p:par>
+                      </p:childTnLst>
+                    </p:cTn>
+                  </p:par>
+                  <p:par>
+                    <p:cTn id="11" fill="hold">
+                      <p:stCondLst>
+                        <p:cond delay="indefinite"/>
+                      </p:stCondLst>
+                      <p:childTnLst>
+                        <p:par>
+                          <p:cTn id="12" fill="hold">
+                            <p:stCondLst>
+                              <p:cond delay="0"/>
+                            </p:stCondLst>
+                            <p:childTnLst>
+                              <p:par>
+                                <p:cTn id="13" presetID="1" presetClass="entr" presetSubtype="0" fill="hold" nodeType="clickEffect">
+                                  <p:stCondLst>
+                                    <p:cond delay="0"/>
+                                  </p:stCondLst>
+                                  <p:childTnLst>
+                                    <p:set>
+                                      <p:cBhvr>
+                                        <p:cTn id="14" dur="1" fill="hold">
+                                          <p:stCondLst>
+                                            <p:cond delay="0"/>
+                                          </p:stCondLst>
+                                        </p:cTn>
+                                        <p:tgtEl>
+                                          <p:spTgt spid="6148"/>
+                                        </p:tgtEl>
+                                        <p:attrNameLst>
+                                          <p:attrName>style.visibility</p:attrName>
+                                        </p:attrNameLst>
+                                      </p:cBhvr>
+                                      <p:to>
+                                        <p:strVal val="visible"/>
+                                      </p:to>
+                                    </p:set>
+                                  </p:childTnLst>
+                                </p:cTn>
+                              </p:par>
+                            </p:childTnLst>
+                          </p:cTn>
+                        </p:par>
+                      </p:childTnLst>
+                    </p:cTn>
+                  </p:par>
+                </p:childTnLst>
+              </p:cTn>
+              <p:prevCondLst>
+                <p:cond evt="onPrev" delay="0">
+                  <p:tgtEl>
+                    <p:sldTgt/>
+                  </p:tgtEl>
+                </p:cond>
+              </p:prevCondLst>
+              <p:nextCondLst>
+                <p:cond evt="onNext" delay="0">
+                  <p:tgtEl>
+                    <p:sldTgt/>
+                  </p:tgtEl>
+                </p:cond>
+              </p:nextCondLst>
+            </p:seq>
+          </p:childTnLst>
+        </p:cTn>
+      </p:par>
+    </p:tnLst>
+  </p:timing>
 </p:sld>
 </file>
 
@@ -13211,6 +13364,126 @@
   <p:clrMapOvr>
     <a:masterClrMapping/>
   </p:clrMapOvr>
+  <p:timing>
+    <p:tnLst>
+      <p:par>
+        <p:cTn id="1" dur="indefinite" restart="never" nodeType="tmRoot">
+          <p:childTnLst>
+            <p:seq concurrent="1" nextAc="seek">
+              <p:cTn id="2" dur="indefinite" nodeType="mainSeq">
+                <p:childTnLst>
+                  <p:par>
+                    <p:cTn id="3" fill="hold">
+                      <p:stCondLst>
+                        <p:cond delay="indefinite"/>
+                      </p:stCondLst>
+                      <p:childTnLst>
+                        <p:par>
+                          <p:cTn id="4" fill="hold">
+                            <p:stCondLst>
+                              <p:cond delay="0"/>
+                            </p:stCondLst>
+                            <p:childTnLst>
+                              <p:par>
+                                <p:cTn id="5" presetID="1" presetClass="entr" presetSubtype="0" fill="hold" nodeType="clickEffect">
+                                  <p:stCondLst>
+                                    <p:cond delay="0"/>
+                                  </p:stCondLst>
+                                  <p:childTnLst>
+                                    <p:set>
+                                      <p:cBhvr>
+                                        <p:cTn id="6" dur="1" fill="hold">
+                                          <p:stCondLst>
+                                            <p:cond delay="0"/>
+                                          </p:stCondLst>
+                                        </p:cTn>
+                                        <p:tgtEl>
+                                          <p:spTgt spid="7170"/>
+                                        </p:tgtEl>
+                                        <p:attrNameLst>
+                                          <p:attrName>style.visibility</p:attrName>
+                                        </p:attrNameLst>
+                                      </p:cBhvr>
+                                      <p:to>
+                                        <p:strVal val="visible"/>
+                                      </p:to>
+                                    </p:set>
+                                  </p:childTnLst>
+                                </p:cTn>
+                              </p:par>
+                            </p:childTnLst>
+                          </p:cTn>
+                        </p:par>
+                      </p:childTnLst>
+                    </p:cTn>
+                  </p:par>
+                  <p:par>
+                    <p:cTn id="7" fill="hold">
+                      <p:stCondLst>
+                        <p:cond delay="indefinite"/>
+                      </p:stCondLst>
+                      <p:childTnLst>
+                        <p:par>
+                          <p:cTn id="8" fill="hold">
+                            <p:stCondLst>
+                              <p:cond delay="0"/>
+                            </p:stCondLst>
+                            <p:childTnLst>
+                              <p:par>
+                                <p:cTn id="9" presetID="1" presetClass="entr" presetSubtype="0" fill="hold" nodeType="clickEffect">
+                                  <p:stCondLst>
+                                    <p:cond delay="0"/>
+                                  </p:stCondLst>
+                                  <p:childTnLst>
+                                    <p:set>
+                                      <p:cBhvr>
+                                        <p:cTn id="10" dur="1" fill="hold">
+                                          <p:stCondLst>
+                                            <p:cond delay="0"/>
+                                          </p:stCondLst>
+                                        </p:cTn>
+                                        <p:tgtEl>
+                                          <p:spTgt spid="7172"/>
+                                        </p:tgtEl>
+                                        <p:attrNameLst>
+                                          <p:attrName>style.visibility</p:attrName>
+                                        </p:attrNameLst>
+                                      </p:cBhvr>
+                                      <p:to>
+                                        <p:strVal val="visible"/>
+                                      </p:to>
+                                    </p:set>
+                                  </p:childTnLst>
+                                </p:cTn>
+                              </p:par>
+                            </p:childTnLst>
+                          </p:cTn>
+                        </p:par>
+                      </p:childTnLst>
+                    </p:cTn>
+                  </p:par>
+                </p:childTnLst>
+              </p:cTn>
+              <p:prevCondLst>
+                <p:cond evt="onPrev" delay="0">
+                  <p:tgtEl>
+                    <p:sldTgt/>
+                  </p:tgtEl>
+                </p:cond>
+              </p:prevCondLst>
+              <p:nextCondLst>
+                <p:cond evt="onNext" delay="0">
+                  <p:tgtEl>
+                    <p:sldTgt/>
+                  </p:tgtEl>
+                </p:cond>
+              </p:nextCondLst>
+            </p:seq>
+          </p:childTnLst>
+        </p:cTn>
+      </p:par>
+    </p:tnLst>
+  </p:timing>
 </p:sld>
 </file>
 
@@ -13608,29 +13881,7 @@
                 <a:latin typeface="PingFang SC" panose="020B0400000000000000" pitchFamily="34" charset="-122"/>
                 <a:ea typeface="PingFang SC" panose="020B0400000000000000" pitchFamily="34" charset="-122"/>
               </a:rPr>
-              <a:t>的大小（</a:t>
-            </a:r>
-            <a:r>
-              <a:rPr lang="en-US" altLang="zh-CN" b="0" i="0" dirty="0">
-                <a:solidFill>
-                  <a:srgbClr val="333333"/>
-                </a:solidFill>
-                <a:effectLst/>
-                <a:latin typeface="PingFang SC" panose="020B0400000000000000" pitchFamily="34" charset="-122"/>
-                <a:ea typeface="PingFang SC" panose="020B0400000000000000" pitchFamily="34" charset="-122"/>
-              </a:rPr>
-              <a:t>Filter</a:t>
-            </a:r>
-            <a:r>
-              <a:rPr lang="zh-CN" altLang="en-US" b="0" i="0" dirty="0">
-                <a:solidFill>
-                  <a:srgbClr val="333333"/>
-                </a:solidFill>
-                <a:effectLst/>
-                <a:latin typeface="PingFang SC" panose="020B0400000000000000" pitchFamily="34" charset="-122"/>
-                <a:ea typeface="PingFang SC" panose="020B0400000000000000" pitchFamily="34" charset="-122"/>
-              </a:rPr>
-              <a:t>的宽度和高度一样）、步幅、卷积后的</a:t>
+              <a:t>的大小、步幅、卷积后的</a:t>
             </a:r>
             <a:r>
               <a:rPr lang="en" altLang="zh-CN" b="0" i="0" dirty="0">
@@ -13823,7 +14074,7 @@
         </p:blipFill>
         <p:spPr bwMode="auto">
           <a:xfrm>
-            <a:off x="1203661" y="3429000"/>
+            <a:off x="1203661" y="3605537"/>
             <a:ext cx="4794180" cy="1947636"/>
           </a:xfrm>
           <a:prstGeom prst="rect">
@@ -13843,10 +14094,10 @@
       </p:pic>
       <p:pic>
         <p:nvPicPr>
-          <p:cNvPr id="8" name="图片 7">
+          <p:cNvPr id="10" name="图片 9">
             <a:extLst>
               <a:ext uri="{FF2B5EF4-FFF2-40B4-BE49-F238E27FC236}">
-                <a16:creationId xmlns:a16="http://schemas.microsoft.com/office/drawing/2014/main" id="{6189FB3A-9626-1EE8-F3E4-A14F8D64064B}"/>
+                <a16:creationId xmlns:a16="http://schemas.microsoft.com/office/drawing/2014/main" id="{91E0E75B-EB38-52FD-0808-334C2C986150}"/>
               </a:ext>
             </a:extLst>
           </p:cNvPr>
@@ -13869,8 +14120,8 @@
         </p:blipFill>
         <p:spPr>
           <a:xfrm>
-            <a:off x="3918857" y="2614548"/>
-            <a:ext cx="5142941" cy="814452"/>
+            <a:off x="6379177" y="3708406"/>
+            <a:ext cx="5142942" cy="1668230"/>
           </a:xfrm>
           <a:prstGeom prst="rect">
             <a:avLst/>
@@ -13879,10 +14130,10 @@
       </p:pic>
       <p:pic>
         <p:nvPicPr>
-          <p:cNvPr id="10" name="图片 9">
+          <p:cNvPr id="4" name="图片 3">
             <a:extLst>
               <a:ext uri="{FF2B5EF4-FFF2-40B4-BE49-F238E27FC236}">
-                <a16:creationId xmlns:a16="http://schemas.microsoft.com/office/drawing/2014/main" id="{91E0E75B-EB38-52FD-0808-334C2C986150}"/>
+                <a16:creationId xmlns:a16="http://schemas.microsoft.com/office/drawing/2014/main" id="{F4545594-9153-46F3-20C5-6D1966BBACE4}"/>
               </a:ext>
             </a:extLst>
           </p:cNvPr>
@@ -13905,8 +14156,8 @@
         </p:blipFill>
         <p:spPr>
           <a:xfrm>
-            <a:off x="6379177" y="3708406"/>
-            <a:ext cx="5142942" cy="1668230"/>
+            <a:off x="3388659" y="2553159"/>
+            <a:ext cx="4580353" cy="1126586"/>
           </a:xfrm>
           <a:prstGeom prst="rect">
             <a:avLst/>
@@ -13926,6 +14177,269 @@
   <p:clrMapOvr>
     <a:masterClrMapping/>
   </p:clrMapOvr>
+  <p:timing>
+    <p:tnLst>
+      <p:par>
+        <p:cTn id="1" dur="indefinite" restart="never" nodeType="tmRoot">
+          <p:childTnLst>
+            <p:seq concurrent="1" nextAc="seek">
+              <p:cTn id="2" dur="indefinite" nodeType="mainSeq">
+                <p:childTnLst>
+                  <p:par>
+                    <p:cTn id="3" fill="hold">
+                      <p:stCondLst>
+                        <p:cond delay="indefinite"/>
+                      </p:stCondLst>
+                      <p:childTnLst>
+                        <p:par>
+                          <p:cTn id="4" fill="hold">
+                            <p:stCondLst>
+                              <p:cond delay="0"/>
+                            </p:stCondLst>
+                            <p:childTnLst>
+                              <p:par>
+                                <p:cTn id="5" presetID="1" presetClass="entr" presetSubtype="0" fill="hold" nodeType="clickEffect">
+                                  <p:stCondLst>
+                                    <p:cond delay="0"/>
+                                  </p:stCondLst>
+                                  <p:childTnLst>
+                                    <p:set>
+                                      <p:cBhvr>
+                                        <p:cTn id="6" dur="1" fill="hold">
+                                          <p:stCondLst>
+                                            <p:cond delay="0"/>
+                                          </p:stCondLst>
+                                        </p:cTn>
+                                        <p:tgtEl>
+                                          <p:spTgt spid="6">
+                                            <p:txEl>
+                                              <p:pRg st="0" end="0"/>
+                                            </p:txEl>
+                                          </p:spTgt>
+                                        </p:tgtEl>
+                                        <p:attrNameLst>
+                                          <p:attrName>style.visibility</p:attrName>
+                                        </p:attrNameLst>
+                                      </p:cBhvr>
+                                      <p:to>
+                                        <p:strVal val="visible"/>
+                                      </p:to>
+                                    </p:set>
+                                  </p:childTnLst>
+                                </p:cTn>
+                              </p:par>
+                            </p:childTnLst>
+                          </p:cTn>
+                        </p:par>
+                      </p:childTnLst>
+                    </p:cTn>
+                  </p:par>
+                  <p:par>
+                    <p:cTn id="7" fill="hold">
+                      <p:stCondLst>
+                        <p:cond delay="indefinite"/>
+                      </p:stCondLst>
+                      <p:childTnLst>
+                        <p:par>
+                          <p:cTn id="8" fill="hold">
+                            <p:stCondLst>
+                              <p:cond delay="0"/>
+                            </p:stCondLst>
+                            <p:childTnLst>
+                              <p:par>
+                                <p:cTn id="9" presetID="1" presetClass="entr" presetSubtype="0" fill="hold" nodeType="clickEffect">
+                                  <p:stCondLst>
+                                    <p:cond delay="0"/>
+                                  </p:stCondLst>
+                                  <p:childTnLst>
+                                    <p:set>
+                                      <p:cBhvr>
+                                        <p:cTn id="10" dur="1" fill="hold">
+                                          <p:stCondLst>
+                                            <p:cond delay="0"/>
+                                          </p:stCondLst>
+                                        </p:cTn>
+                                        <p:tgtEl>
+                                          <p:spTgt spid="5"/>
+                                        </p:tgtEl>
+                                        <p:attrNameLst>
+                                          <p:attrName>style.visibility</p:attrName>
+                                        </p:attrNameLst>
+                                      </p:cBhvr>
+                                      <p:to>
+                                        <p:strVal val="visible"/>
+                                      </p:to>
+                                    </p:set>
+                                  </p:childTnLst>
+                                </p:cTn>
+                              </p:par>
+                            </p:childTnLst>
+                          </p:cTn>
+                        </p:par>
+                      </p:childTnLst>
+                    </p:cTn>
+                  </p:par>
+                  <p:par>
+                    <p:cTn id="11" fill="hold">
+                      <p:stCondLst>
+                        <p:cond delay="indefinite"/>
+                      </p:stCondLst>
+                      <p:childTnLst>
+                        <p:par>
+                          <p:cTn id="12" fill="hold">
+                            <p:stCondLst>
+                              <p:cond delay="0"/>
+                            </p:stCondLst>
+                            <p:childTnLst>
+                              <p:par>
+                                <p:cTn id="13" presetID="1" presetClass="entr" presetSubtype="0" fill="hold" nodeType="clickEffect">
+                                  <p:stCondLst>
+                                    <p:cond delay="0"/>
+                                  </p:stCondLst>
+                                  <p:childTnLst>
+                                    <p:set>
+                                      <p:cBhvr>
+                                        <p:cTn id="14" dur="1" fill="hold">
+                                          <p:stCondLst>
+                                            <p:cond delay="0"/>
+                                          </p:stCondLst>
+                                        </p:cTn>
+                                        <p:tgtEl>
+                                          <p:spTgt spid="6">
+                                            <p:txEl>
+                                              <p:pRg st="1" end="1"/>
+                                            </p:txEl>
+                                          </p:spTgt>
+                                        </p:tgtEl>
+                                        <p:attrNameLst>
+                                          <p:attrName>style.visibility</p:attrName>
+                                        </p:attrNameLst>
+                                      </p:cBhvr>
+                                      <p:to>
+                                        <p:strVal val="visible"/>
+                                      </p:to>
+                                    </p:set>
+                                  </p:childTnLst>
+                                </p:cTn>
+                              </p:par>
+                            </p:childTnLst>
+                          </p:cTn>
+                        </p:par>
+                      </p:childTnLst>
+                    </p:cTn>
+                  </p:par>
+                  <p:par>
+                    <p:cTn id="15" fill="hold">
+                      <p:stCondLst>
+                        <p:cond delay="indefinite"/>
+                      </p:stCondLst>
+                      <p:childTnLst>
+                        <p:par>
+                          <p:cTn id="16" fill="hold">
+                            <p:stCondLst>
+                              <p:cond delay="0"/>
+                            </p:stCondLst>
+                            <p:childTnLst>
+                              <p:par>
+                                <p:cTn id="17" presetID="1" presetClass="entr" presetSubtype="0" fill="hold" nodeType="clickEffect">
+                                  <p:stCondLst>
+                                    <p:cond delay="0"/>
+                                  </p:stCondLst>
+                                  <p:childTnLst>
+                                    <p:set>
+                                      <p:cBhvr>
+                                        <p:cTn id="18" dur="1" fill="hold">
+                                          <p:stCondLst>
+                                            <p:cond delay="0"/>
+                                          </p:stCondLst>
+                                        </p:cTn>
+                                        <p:tgtEl>
+                                          <p:spTgt spid="4"/>
+                                        </p:tgtEl>
+                                        <p:attrNameLst>
+                                          <p:attrName>style.visibility</p:attrName>
+                                        </p:attrNameLst>
+                                      </p:cBhvr>
+                                      <p:to>
+                                        <p:strVal val="visible"/>
+                                      </p:to>
+                                    </p:set>
+                                  </p:childTnLst>
+                                </p:cTn>
+                              </p:par>
+                            </p:childTnLst>
+                          </p:cTn>
+                        </p:par>
+                      </p:childTnLst>
+                    </p:cTn>
+                  </p:par>
+                  <p:par>
+                    <p:cTn id="19" fill="hold">
+                      <p:stCondLst>
+                        <p:cond delay="indefinite"/>
+                      </p:stCondLst>
+                      <p:childTnLst>
+                        <p:par>
+                          <p:cTn id="20" fill="hold">
+                            <p:stCondLst>
+                              <p:cond delay="0"/>
+                            </p:stCondLst>
+                            <p:childTnLst>
+                              <p:par>
+                                <p:cTn id="21" presetID="1" presetClass="entr" presetSubtype="0" fill="hold" nodeType="clickEffect">
+                                  <p:stCondLst>
+                                    <p:cond delay="0"/>
+                                  </p:stCondLst>
+                                  <p:childTnLst>
+                                    <p:set>
+                                      <p:cBhvr>
+                                        <p:cTn id="22" dur="1" fill="hold">
+                                          <p:stCondLst>
+                                            <p:cond delay="0"/>
+                                          </p:stCondLst>
+                                        </p:cTn>
+                                        <p:tgtEl>
+                                          <p:spTgt spid="10"/>
+                                        </p:tgtEl>
+                                        <p:attrNameLst>
+                                          <p:attrName>style.visibility</p:attrName>
+                                        </p:attrNameLst>
+                                      </p:cBhvr>
+                                      <p:to>
+                                        <p:strVal val="visible"/>
+                                      </p:to>
+                                    </p:set>
+                                  </p:childTnLst>
+                                </p:cTn>
+                              </p:par>
+                            </p:childTnLst>
+                          </p:cTn>
+                        </p:par>
+                      </p:childTnLst>
+                    </p:cTn>
+                  </p:par>
+                </p:childTnLst>
+              </p:cTn>
+              <p:prevCondLst>
+                <p:cond evt="onPrev" delay="0">
+                  <p:tgtEl>
+                    <p:sldTgt/>
+                  </p:tgtEl>
+                </p:cond>
+              </p:prevCondLst>
+              <p:nextCondLst>
+                <p:cond evt="onNext" delay="0">
+                  <p:tgtEl>
+                    <p:sldTgt/>
+                  </p:tgtEl>
+                </p:cond>
+              </p:nextCondLst>
+            </p:seq>
+          </p:childTnLst>
+        </p:cTn>
+      </p:par>
+    </p:tnLst>
+  </p:timing>
 </p:sld>
 </file>
 
@@ -14665,6 +15179,322 @@
   <p:clrMapOvr>
     <a:masterClrMapping/>
   </p:clrMapOvr>
+  <p:timing>
+    <p:tnLst>
+      <p:par>
+        <p:cTn id="1" dur="indefinite" restart="never" nodeType="tmRoot">
+          <p:childTnLst>
+            <p:seq concurrent="1" nextAc="seek">
+              <p:cTn id="2" dur="indefinite" nodeType="mainSeq">
+                <p:childTnLst>
+                  <p:par>
+                    <p:cTn id="3" fill="hold">
+                      <p:stCondLst>
+                        <p:cond delay="indefinite"/>
+                      </p:stCondLst>
+                      <p:childTnLst>
+                        <p:par>
+                          <p:cTn id="4" fill="hold">
+                            <p:stCondLst>
+                              <p:cond delay="0"/>
+                            </p:stCondLst>
+                            <p:childTnLst>
+                              <p:par>
+                                <p:cTn id="5" presetID="1" presetClass="entr" presetSubtype="0" fill="hold" nodeType="clickEffect">
+                                  <p:stCondLst>
+                                    <p:cond delay="0"/>
+                                  </p:stCondLst>
+                                  <p:childTnLst>
+                                    <p:set>
+                                      <p:cBhvr>
+                                        <p:cTn id="6" dur="1" fill="hold">
+                                          <p:stCondLst>
+                                            <p:cond delay="0"/>
+                                          </p:stCondLst>
+                                        </p:cTn>
+                                        <p:tgtEl>
+                                          <p:spTgt spid="6">
+                                            <p:txEl>
+                                              <p:pRg st="0" end="0"/>
+                                            </p:txEl>
+                                          </p:spTgt>
+                                        </p:tgtEl>
+                                        <p:attrNameLst>
+                                          <p:attrName>style.visibility</p:attrName>
+                                        </p:attrNameLst>
+                                      </p:cBhvr>
+                                      <p:to>
+                                        <p:strVal val="visible"/>
+                                      </p:to>
+                                    </p:set>
+                                  </p:childTnLst>
+                                </p:cTn>
+                              </p:par>
+                            </p:childTnLst>
+                          </p:cTn>
+                        </p:par>
+                      </p:childTnLst>
+                    </p:cTn>
+                  </p:par>
+                  <p:par>
+                    <p:cTn id="7" fill="hold">
+                      <p:stCondLst>
+                        <p:cond delay="indefinite"/>
+                      </p:stCondLst>
+                      <p:childTnLst>
+                        <p:par>
+                          <p:cTn id="8" fill="hold">
+                            <p:stCondLst>
+                              <p:cond delay="0"/>
+                            </p:stCondLst>
+                            <p:childTnLst>
+                              <p:par>
+                                <p:cTn id="9" presetID="1" presetClass="entr" presetSubtype="0" fill="hold" grpId="0" nodeType="clickEffect">
+                                  <p:stCondLst>
+                                    <p:cond delay="0"/>
+                                  </p:stCondLst>
+                                  <p:childTnLst>
+                                    <p:set>
+                                      <p:cBhvr>
+                                        <p:cTn id="10" dur="1" fill="hold">
+                                          <p:stCondLst>
+                                            <p:cond delay="0"/>
+                                          </p:stCondLst>
+                                        </p:cTn>
+                                        <p:tgtEl>
+                                          <p:spTgt spid="2"/>
+                                        </p:tgtEl>
+                                        <p:attrNameLst>
+                                          <p:attrName>style.visibility</p:attrName>
+                                        </p:attrNameLst>
+                                      </p:cBhvr>
+                                      <p:to>
+                                        <p:strVal val="visible"/>
+                                      </p:to>
+                                    </p:set>
+                                  </p:childTnLst>
+                                </p:cTn>
+                              </p:par>
+                            </p:childTnLst>
+                          </p:cTn>
+                        </p:par>
+                      </p:childTnLst>
+                    </p:cTn>
+                  </p:par>
+                  <p:par>
+                    <p:cTn id="11" fill="hold">
+                      <p:stCondLst>
+                        <p:cond delay="indefinite"/>
+                      </p:stCondLst>
+                      <p:childTnLst>
+                        <p:par>
+                          <p:cTn id="12" fill="hold">
+                            <p:stCondLst>
+                              <p:cond delay="0"/>
+                            </p:stCondLst>
+                            <p:childTnLst>
+                              <p:par>
+                                <p:cTn id="13" presetID="1" presetClass="entr" presetSubtype="0" fill="hold" nodeType="clickEffect">
+                                  <p:stCondLst>
+                                    <p:cond delay="0"/>
+                                  </p:stCondLst>
+                                  <p:childTnLst>
+                                    <p:set>
+                                      <p:cBhvr>
+                                        <p:cTn id="14" dur="1" fill="hold">
+                                          <p:stCondLst>
+                                            <p:cond delay="0"/>
+                                          </p:stCondLst>
+                                        </p:cTn>
+                                        <p:tgtEl>
+                                          <p:spTgt spid="6">
+                                            <p:txEl>
+                                              <p:pRg st="1" end="1"/>
+                                            </p:txEl>
+                                          </p:spTgt>
+                                        </p:tgtEl>
+                                        <p:attrNameLst>
+                                          <p:attrName>style.visibility</p:attrName>
+                                        </p:attrNameLst>
+                                      </p:cBhvr>
+                                      <p:to>
+                                        <p:strVal val="visible"/>
+                                      </p:to>
+                                    </p:set>
+                                  </p:childTnLst>
+                                </p:cTn>
+                              </p:par>
+                            </p:childTnLst>
+                          </p:cTn>
+                        </p:par>
+                      </p:childTnLst>
+                    </p:cTn>
+                  </p:par>
+                  <p:par>
+                    <p:cTn id="15" fill="hold">
+                      <p:stCondLst>
+                        <p:cond delay="indefinite"/>
+                      </p:stCondLst>
+                      <p:childTnLst>
+                        <p:par>
+                          <p:cTn id="16" fill="hold">
+                            <p:stCondLst>
+                              <p:cond delay="0"/>
+                            </p:stCondLst>
+                            <p:childTnLst>
+                              <p:par>
+                                <p:cTn id="17" presetID="1" presetClass="entr" presetSubtype="0" fill="hold" grpId="0" nodeType="clickEffect">
+                                  <p:stCondLst>
+                                    <p:cond delay="0"/>
+                                  </p:stCondLst>
+                                  <p:childTnLst>
+                                    <p:set>
+                                      <p:cBhvr>
+                                        <p:cTn id="18" dur="1" fill="hold">
+                                          <p:stCondLst>
+                                            <p:cond delay="0"/>
+                                          </p:stCondLst>
+                                        </p:cTn>
+                                        <p:tgtEl>
+                                          <p:spTgt spid="4"/>
+                                        </p:tgtEl>
+                                        <p:attrNameLst>
+                                          <p:attrName>style.visibility</p:attrName>
+                                        </p:attrNameLst>
+                                      </p:cBhvr>
+                                      <p:to>
+                                        <p:strVal val="visible"/>
+                                      </p:to>
+                                    </p:set>
+                                  </p:childTnLst>
+                                </p:cTn>
+                              </p:par>
+                            </p:childTnLst>
+                          </p:cTn>
+                        </p:par>
+                      </p:childTnLst>
+                    </p:cTn>
+                  </p:par>
+                  <p:par>
+                    <p:cTn id="19" fill="hold">
+                      <p:stCondLst>
+                        <p:cond delay="indefinite"/>
+                      </p:stCondLst>
+                      <p:childTnLst>
+                        <p:par>
+                          <p:cTn id="20" fill="hold">
+                            <p:stCondLst>
+                              <p:cond delay="0"/>
+                            </p:stCondLst>
+                            <p:childTnLst>
+                              <p:par>
+                                <p:cTn id="21" presetID="1" presetClass="entr" presetSubtype="0" fill="hold" nodeType="clickEffect">
+                                  <p:stCondLst>
+                                    <p:cond delay="0"/>
+                                  </p:stCondLst>
+                                  <p:childTnLst>
+                                    <p:set>
+                                      <p:cBhvr>
+                                        <p:cTn id="22" dur="1" fill="hold">
+                                          <p:stCondLst>
+                                            <p:cond delay="0"/>
+                                          </p:stCondLst>
+                                        </p:cTn>
+                                        <p:tgtEl>
+                                          <p:spTgt spid="6">
+                                            <p:txEl>
+                                              <p:pRg st="2" end="2"/>
+                                            </p:txEl>
+                                          </p:spTgt>
+                                        </p:tgtEl>
+                                        <p:attrNameLst>
+                                          <p:attrName>style.visibility</p:attrName>
+                                        </p:attrNameLst>
+                                      </p:cBhvr>
+                                      <p:to>
+                                        <p:strVal val="visible"/>
+                                      </p:to>
+                                    </p:set>
+                                  </p:childTnLst>
+                                </p:cTn>
+                              </p:par>
+                            </p:childTnLst>
+                          </p:cTn>
+                        </p:par>
+                      </p:childTnLst>
+                    </p:cTn>
+                  </p:par>
+                  <p:par>
+                    <p:cTn id="23" fill="hold">
+                      <p:stCondLst>
+                        <p:cond delay="indefinite"/>
+                      </p:stCondLst>
+                      <p:childTnLst>
+                        <p:par>
+                          <p:cTn id="24" fill="hold">
+                            <p:stCondLst>
+                              <p:cond delay="0"/>
+                            </p:stCondLst>
+                            <p:childTnLst>
+                              <p:par>
+                                <p:cTn id="25" presetID="1" presetClass="entr" presetSubtype="0" fill="hold" nodeType="clickEffect">
+                                  <p:stCondLst>
+                                    <p:cond delay="0"/>
+                                  </p:stCondLst>
+                                  <p:childTnLst>
+                                    <p:set>
+                                      <p:cBhvr>
+                                        <p:cTn id="26" dur="1" fill="hold">
+                                          <p:stCondLst>
+                                            <p:cond delay="0"/>
+                                          </p:stCondLst>
+                                        </p:cTn>
+                                        <p:tgtEl>
+                                          <p:spTgt spid="11"/>
+                                        </p:tgtEl>
+                                        <p:attrNameLst>
+                                          <p:attrName>style.visibility</p:attrName>
+                                        </p:attrNameLst>
+                                      </p:cBhvr>
+                                      <p:to>
+                                        <p:strVal val="visible"/>
+                                      </p:to>
+                                    </p:set>
+                                  </p:childTnLst>
+                                </p:cTn>
+                              </p:par>
+                            </p:childTnLst>
+                          </p:cTn>
+                        </p:par>
+                      </p:childTnLst>
+                    </p:cTn>
+                  </p:par>
+                </p:childTnLst>
+              </p:cTn>
+              <p:prevCondLst>
+                <p:cond evt="onPrev" delay="0">
+                  <p:tgtEl>
+                    <p:sldTgt/>
+                  </p:tgtEl>
+                </p:cond>
+              </p:prevCondLst>
+              <p:nextCondLst>
+                <p:cond evt="onNext" delay="0">
+                  <p:tgtEl>
+                    <p:sldTgt/>
+                  </p:tgtEl>
+                </p:cond>
+              </p:nextCondLst>
+            </p:seq>
+          </p:childTnLst>
+        </p:cTn>
+      </p:par>
+    </p:tnLst>
+    <p:bldLst>
+      <p:bldP spid="2" grpId="0"/>
+      <p:bldP spid="4" grpId="0"/>
+    </p:bldLst>
+  </p:timing>
 </p:sld>
 </file>
 
@@ -14944,16 +15774,88 @@
               <a:buChar char="•"/>
             </a:pPr>
             <a:r>
-              <a:rPr lang="en-US" altLang="zh-CN" dirty="0"/>
-              <a:t>TODO </a:t>
-            </a:r>
-            <a:r>
-              <a:rPr lang="zh-CN" altLang="en-US" dirty="0"/>
-              <a:t>深度</a:t>
-            </a:r>
-            <a:endParaRPr lang="en-US" altLang="zh-CN" dirty="0"/>
-          </a:p>
-          <a:p>
+              <a:rPr lang="zh-CN" altLang="en-US" b="0" i="0" dirty="0">
+                <a:solidFill>
+                  <a:srgbClr val="333333"/>
+                </a:solidFill>
+                <a:effectLst/>
+                <a:latin typeface="PingFang SC" panose="020B0400000000000000" pitchFamily="34" charset="-122"/>
+                <a:ea typeface="PingFang SC" panose="020B0400000000000000" pitchFamily="34" charset="-122"/>
+              </a:rPr>
+              <a:t>前面我们已经讲了深度为</a:t>
+            </a:r>
+            <a:r>
+              <a:rPr lang="en-US" altLang="zh-CN" b="0" i="0" dirty="0">
+                <a:solidFill>
+                  <a:srgbClr val="333333"/>
+                </a:solidFill>
+                <a:effectLst/>
+                <a:latin typeface="PingFang SC" panose="020B0400000000000000" pitchFamily="34" charset="-122"/>
+                <a:ea typeface="PingFang SC" panose="020B0400000000000000" pitchFamily="34" charset="-122"/>
+              </a:rPr>
+              <a:t>1</a:t>
+            </a:r>
+            <a:r>
+              <a:rPr lang="zh-CN" altLang="en-US" b="0" i="0" dirty="0">
+                <a:solidFill>
+                  <a:srgbClr val="333333"/>
+                </a:solidFill>
+                <a:effectLst/>
+                <a:latin typeface="PingFang SC" panose="020B0400000000000000" pitchFamily="34" charset="-122"/>
+                <a:ea typeface="PingFang SC" panose="020B0400000000000000" pitchFamily="34" charset="-122"/>
+              </a:rPr>
+              <a:t>的卷积层的计算方法，如果深度大于</a:t>
+            </a:r>
+            <a:r>
+              <a:rPr lang="en-US" altLang="zh-CN" b="0" i="0" dirty="0">
+                <a:solidFill>
+                  <a:srgbClr val="333333"/>
+                </a:solidFill>
+                <a:effectLst/>
+                <a:latin typeface="PingFang SC" panose="020B0400000000000000" pitchFamily="34" charset="-122"/>
+                <a:ea typeface="PingFang SC" panose="020B0400000000000000" pitchFamily="34" charset="-122"/>
+              </a:rPr>
+              <a:t>1</a:t>
+            </a:r>
+            <a:r>
+              <a:rPr lang="zh-CN" altLang="en-US" b="0" i="0" dirty="0">
+                <a:solidFill>
+                  <a:srgbClr val="333333"/>
+                </a:solidFill>
+                <a:effectLst/>
+                <a:latin typeface="PingFang SC" panose="020B0400000000000000" pitchFamily="34" charset="-122"/>
+                <a:ea typeface="PingFang SC" panose="020B0400000000000000" pitchFamily="34" charset="-122"/>
+              </a:rPr>
+              <a:t>怎么计算呢？</a:t>
+            </a:r>
+            <a:endParaRPr lang="en-US" altLang="zh-CN" b="0" i="0" dirty="0">
+              <a:solidFill>
+                <a:srgbClr val="333333"/>
+              </a:solidFill>
+              <a:effectLst/>
+              <a:latin typeface="PingFang SC" panose="020B0400000000000000" pitchFamily="34" charset="-122"/>
+              <a:ea typeface="PingFang SC" panose="020B0400000000000000" pitchFamily="34" charset="-122"/>
+            </a:endParaRPr>
+          </a:p>
+          <a:p>
+            <a:pPr marL="285750" indent="-285750">
+              <a:buFont typeface="Arial" panose="020B0604020202020204" pitchFamily="34" charset="0"/>
+              <a:buChar char="•"/>
+            </a:pPr>
+            <a:endParaRPr lang="en-US" altLang="zh-CN" b="0" i="0" dirty="0">
+              <a:solidFill>
+                <a:srgbClr val="333333"/>
+              </a:solidFill>
+              <a:effectLst/>
+              <a:latin typeface="PingFang SC" panose="020B0400000000000000" pitchFamily="34" charset="-122"/>
+              <a:ea typeface="PingFang SC" panose="020B0400000000000000" pitchFamily="34" charset="-122"/>
+            </a:endParaRPr>
+          </a:p>
+          <a:p>
+            <a:pPr marL="285750" indent="-285750">
+              <a:buFont typeface="Arial" panose="020B0604020202020204" pitchFamily="34" charset="0"/>
+              <a:buChar char="•"/>
+            </a:pPr>
             <a:endParaRPr lang="en-US" altLang="zh-CN" dirty="0"/>
           </a:p>
           <a:p>
@@ -15031,6 +15933,78 @@
           </a:p>
         </p:txBody>
       </p:sp>
+      <p:pic>
+        <p:nvPicPr>
+          <p:cNvPr id="4" name="图片 3">
+            <a:extLst>
+              <a:ext uri="{FF2B5EF4-FFF2-40B4-BE49-F238E27FC236}">
+                <a16:creationId xmlns:a16="http://schemas.microsoft.com/office/drawing/2014/main" id="{B6D73588-5475-3883-B51C-4421B5149332}"/>
+              </a:ext>
+            </a:extLst>
+          </p:cNvPr>
+          <p:cNvPicPr>
+            <a:picLocks noChangeAspect="1"/>
+          </p:cNvPicPr>
+          <p:nvPr/>
+        </p:nvPicPr>
+        <p:blipFill>
+          <a:blip r:embed="rId3">
+            <a:extLst>
+              <a:ext uri="{28A0092B-C50C-407E-A947-70E740481C1C}">
+                <a14:useLocalDpi xmlns:a14="http://schemas.microsoft.com/office/drawing/2010/main" val="0"/>
+              </a:ext>
+            </a:extLst>
+          </a:blip>
+          <a:stretch>
+            <a:fillRect/>
+          </a:stretch>
+        </p:blipFill>
+        <p:spPr>
+          <a:xfrm>
+            <a:off x="4770401" y="2858420"/>
+            <a:ext cx="6724605" cy="3071733"/>
+          </a:xfrm>
+          <a:prstGeom prst="rect">
+            <a:avLst/>
+          </a:prstGeom>
+        </p:spPr>
+      </p:pic>
+      <p:pic>
+        <p:nvPicPr>
+          <p:cNvPr id="5" name="图片 4">
+            <a:extLst>
+              <a:ext uri="{FF2B5EF4-FFF2-40B4-BE49-F238E27FC236}">
+                <a16:creationId xmlns:a16="http://schemas.microsoft.com/office/drawing/2014/main" id="{3E0B4F72-C5AA-52F0-F948-15EC99A53EFD}"/>
+              </a:ext>
+            </a:extLst>
+          </p:cNvPr>
+          <p:cNvPicPr>
+            <a:picLocks noChangeAspect="1"/>
+          </p:cNvPicPr>
+          <p:nvPr/>
+        </p:nvPicPr>
+        <p:blipFill>
+          <a:blip r:embed="rId4">
+            <a:extLst>
+              <a:ext uri="{28A0092B-C50C-407E-A947-70E740481C1C}">
+                <a14:useLocalDpi xmlns:a14="http://schemas.microsoft.com/office/drawing/2010/main" val="0"/>
+              </a:ext>
+            </a:extLst>
+          </a:blip>
+          <a:stretch>
+            <a:fillRect/>
+          </a:stretch>
+        </p:blipFill>
+        <p:spPr>
+          <a:xfrm>
+            <a:off x="1074701" y="4588137"/>
+            <a:ext cx="3695700" cy="1028700"/>
+          </a:xfrm>
+          <a:prstGeom prst="rect">
+            <a:avLst/>
+          </a:prstGeom>
+        </p:spPr>
+      </p:pic>
     </p:spTree>
     <p:custDataLst>
       <p:tags r:id="rId1"/>
@@ -15044,6 +16018,175 @@
   <p:clrMapOvr>
     <a:masterClrMapping/>
   </p:clrMapOvr>
+  <p:timing>
+    <p:tnLst>
+      <p:par>
+        <p:cTn id="1" dur="indefinite" restart="never" nodeType="tmRoot">
+          <p:childTnLst>
+            <p:seq concurrent="1" nextAc="seek">
+              <p:cTn id="2" dur="indefinite" nodeType="mainSeq">
+                <p:childTnLst>
+                  <p:par>
+                    <p:cTn id="3" fill="hold">
+                      <p:stCondLst>
+                        <p:cond delay="indefinite"/>
+                      </p:stCondLst>
+                      <p:childTnLst>
+                        <p:par>
+                          <p:cTn id="4" fill="hold">
+                            <p:stCondLst>
+                              <p:cond delay="0"/>
+                            </p:stCondLst>
+                            <p:childTnLst>
+                              <p:par>
+                                <p:cTn id="5" presetID="1" presetClass="entr" presetSubtype="0" fill="hold" nodeType="clickEffect">
+                                  <p:stCondLst>
+                                    <p:cond delay="0"/>
+                                  </p:stCondLst>
+                                  <p:childTnLst>
+                                    <p:set>
+                                      <p:cBhvr>
+                                        <p:cTn id="6" dur="1" fill="hold">
+                                          <p:stCondLst>
+                                            <p:cond delay="0"/>
+                                          </p:stCondLst>
+                                        </p:cTn>
+                                        <p:tgtEl>
+                                          <p:spTgt spid="6">
+                                            <p:txEl>
+                                              <p:pRg st="0" end="0"/>
+                                            </p:txEl>
+                                          </p:spTgt>
+                                        </p:tgtEl>
+                                        <p:attrNameLst>
+                                          <p:attrName>style.visibility</p:attrName>
+                                        </p:attrNameLst>
+                                      </p:cBhvr>
+                                      <p:to>
+                                        <p:strVal val="visible"/>
+                                      </p:to>
+                                    </p:set>
+                                  </p:childTnLst>
+                                </p:cTn>
+                              </p:par>
+                            </p:childTnLst>
+                          </p:cTn>
+                        </p:par>
+                      </p:childTnLst>
+                    </p:cTn>
+                  </p:par>
+                  <p:par>
+                    <p:cTn id="7" fill="hold">
+                      <p:stCondLst>
+                        <p:cond delay="indefinite"/>
+                      </p:stCondLst>
+                      <p:childTnLst>
+                        <p:par>
+                          <p:cTn id="8" fill="hold">
+                            <p:stCondLst>
+                              <p:cond delay="0"/>
+                            </p:stCondLst>
+                            <p:childTnLst>
+                              <p:par>
+                                <p:cTn id="9" presetID="1" presetClass="entr" presetSubtype="0" fill="hold" nodeType="clickEffect">
+                                  <p:stCondLst>
+                                    <p:cond delay="0"/>
+                                  </p:stCondLst>
+                                  <p:childTnLst>
+                                    <p:set>
+                                      <p:cBhvr>
+                                        <p:cTn id="10" dur="1" fill="hold">
+                                          <p:stCondLst>
+                                            <p:cond delay="0"/>
+                                          </p:stCondLst>
+                                        </p:cTn>
+                                        <p:tgtEl>
+                                          <p:spTgt spid="5"/>
+                                        </p:tgtEl>
+                                        <p:attrNameLst>
+                                          <p:attrName>style.visibility</p:attrName>
+                                        </p:attrNameLst>
+                                      </p:cBhvr>
+                                      <p:to>
+                                        <p:strVal val="visible"/>
+                                      </p:to>
+                                    </p:set>
+                                  </p:childTnLst>
+                                </p:cTn>
+                              </p:par>
+                            </p:childTnLst>
+                          </p:cTn>
+                        </p:par>
+                      </p:childTnLst>
+                    </p:cTn>
+                  </p:par>
+                  <p:par>
+                    <p:cTn id="11" fill="hold">
+                      <p:stCondLst>
+                        <p:cond delay="indefinite"/>
+                      </p:stCondLst>
+                      <p:childTnLst>
+                        <p:par>
+                          <p:cTn id="12" fill="hold">
+                            <p:stCondLst>
+                              <p:cond delay="0"/>
+                            </p:stCondLst>
+                            <p:childTnLst>
+                              <p:par>
+                                <p:cTn id="13" presetID="1" presetClass="entr" presetSubtype="0" fill="hold" nodeType="clickEffect">
+                                  <p:stCondLst>
+                                    <p:cond delay="0"/>
+                                  </p:stCondLst>
+                                  <p:childTnLst>
+                                    <p:set>
+                                      <p:cBhvr>
+                                        <p:cTn id="14" dur="1" fill="hold">
+                                          <p:stCondLst>
+                                            <p:cond delay="0"/>
+                                          </p:stCondLst>
+                                        </p:cTn>
+                                        <p:tgtEl>
+                                          <p:spTgt spid="4"/>
+                                        </p:tgtEl>
+                                        <p:attrNameLst>
+                                          <p:attrName>style.visibility</p:attrName>
+                                        </p:attrNameLst>
+                                      </p:cBhvr>
+                                      <p:to>
+                                        <p:strVal val="visible"/>
+                                      </p:to>
+                                    </p:set>
+                                  </p:childTnLst>
+                                </p:cTn>
+                              </p:par>
+                            </p:childTnLst>
+                          </p:cTn>
+                        </p:par>
+                      </p:childTnLst>
+                    </p:cTn>
+                  </p:par>
+                </p:childTnLst>
+              </p:cTn>
+              <p:prevCondLst>
+                <p:cond evt="onPrev" delay="0">
+                  <p:tgtEl>
+                    <p:sldTgt/>
+                  </p:tgtEl>
+                </p:cond>
+              </p:prevCondLst>
+              <p:nextCondLst>
+                <p:cond evt="onNext" delay="0">
+                  <p:tgtEl>
+                    <p:sldTgt/>
+                  </p:tgtEl>
+                </p:cond>
+              </p:nextCondLst>
+            </p:seq>
+          </p:childTnLst>
+        </p:cTn>
+      </p:par>
+    </p:tnLst>
+  </p:timing>
 </p:sld>
 </file>
 
@@ -15322,20 +16465,215 @@
               <a:buFont typeface="Arial" panose="020B0604020202020204" pitchFamily="34" charset="0"/>
               <a:buChar char="•"/>
             </a:pPr>
-            <a:endParaRPr lang="en-US" altLang="zh-CN" dirty="0"/>
-          </a:p>
-          <a:p>
-            <a:endParaRPr lang="en-US" altLang="zh-CN" dirty="0"/>
-          </a:p>
-          <a:p>
-            <a:pPr marL="285750" indent="-285750">
-              <a:buFont typeface="Arial" panose="020B0604020202020204" pitchFamily="34" charset="0"/>
-              <a:buChar char="•"/>
-            </a:pPr>
-            <a:r>
-              <a:rPr lang="zh-CN" altLang="en-US" dirty="0"/>
-              <a:t>自学、互学、展学</a:t>
-            </a:r>
+            <a:r>
+              <a:rPr lang="zh-CN" altLang="en-US" b="0" i="0" dirty="0">
+                <a:solidFill>
+                  <a:srgbClr val="333333"/>
+                </a:solidFill>
+                <a:effectLst/>
+                <a:latin typeface="PingFang SC" panose="020B0400000000000000" pitchFamily="34" charset="-122"/>
+                <a:ea typeface="PingFang SC" panose="020B0400000000000000" pitchFamily="34" charset="-122"/>
+              </a:rPr>
+              <a:t>每个卷积层可以有多个</a:t>
+            </a:r>
+            <a:r>
+              <a:rPr lang="en" altLang="zh-CN" b="0" i="0" dirty="0">
+                <a:solidFill>
+                  <a:srgbClr val="333333"/>
+                </a:solidFill>
+                <a:effectLst/>
+                <a:latin typeface="PingFang SC" panose="020B0400000000000000" pitchFamily="34" charset="-122"/>
+                <a:ea typeface="PingFang SC" panose="020B0400000000000000" pitchFamily="34" charset="-122"/>
+              </a:rPr>
+              <a:t>filter</a:t>
+            </a:r>
+            <a:r>
+              <a:rPr lang="zh-CN" altLang="en" b="0" i="0" dirty="0">
+                <a:solidFill>
+                  <a:srgbClr val="333333"/>
+                </a:solidFill>
+                <a:effectLst/>
+                <a:latin typeface="PingFang SC" panose="020B0400000000000000" pitchFamily="34" charset="-122"/>
+                <a:ea typeface="PingFang SC" panose="020B0400000000000000" pitchFamily="34" charset="-122"/>
+              </a:rPr>
+              <a:t>。</a:t>
+            </a:r>
+            <a:r>
+              <a:rPr lang="zh-CN" altLang="en-US" b="0" i="0" dirty="0">
+                <a:solidFill>
+                  <a:srgbClr val="333333"/>
+                </a:solidFill>
+                <a:effectLst/>
+                <a:latin typeface="PingFang SC" panose="020B0400000000000000" pitchFamily="34" charset="-122"/>
+                <a:ea typeface="PingFang SC" panose="020B0400000000000000" pitchFamily="34" charset="-122"/>
+              </a:rPr>
+              <a:t>每个</a:t>
+            </a:r>
+            <a:r>
+              <a:rPr lang="en" altLang="zh-CN" b="0" i="0" dirty="0">
+                <a:solidFill>
+                  <a:srgbClr val="333333"/>
+                </a:solidFill>
+                <a:effectLst/>
+                <a:latin typeface="PingFang SC" panose="020B0400000000000000" pitchFamily="34" charset="-122"/>
+                <a:ea typeface="PingFang SC" panose="020B0400000000000000" pitchFamily="34" charset="-122"/>
+              </a:rPr>
+              <a:t>filter</a:t>
+            </a:r>
+            <a:r>
+              <a:rPr lang="zh-CN" altLang="en-US" b="0" i="0" dirty="0">
+                <a:solidFill>
+                  <a:srgbClr val="333333"/>
+                </a:solidFill>
+                <a:effectLst/>
+                <a:latin typeface="PingFang SC" panose="020B0400000000000000" pitchFamily="34" charset="-122"/>
+                <a:ea typeface="PingFang SC" panose="020B0400000000000000" pitchFamily="34" charset="-122"/>
+              </a:rPr>
+              <a:t>和原始图像进行卷积后，都可以得到一个</a:t>
+            </a:r>
+            <a:r>
+              <a:rPr lang="en" altLang="zh-CN" b="0" i="0" dirty="0">
+                <a:solidFill>
+                  <a:srgbClr val="333333"/>
+                </a:solidFill>
+                <a:effectLst/>
+                <a:latin typeface="PingFang SC" panose="020B0400000000000000" pitchFamily="34" charset="-122"/>
+                <a:ea typeface="PingFang SC" panose="020B0400000000000000" pitchFamily="34" charset="-122"/>
+              </a:rPr>
+              <a:t>Feature Map</a:t>
+            </a:r>
+            <a:r>
+              <a:rPr lang="zh-CN" altLang="en" b="0" i="0" dirty="0">
+                <a:solidFill>
+                  <a:srgbClr val="333333"/>
+                </a:solidFill>
+                <a:effectLst/>
+                <a:latin typeface="PingFang SC" panose="020B0400000000000000" pitchFamily="34" charset="-122"/>
+                <a:ea typeface="PingFang SC" panose="020B0400000000000000" pitchFamily="34" charset="-122"/>
+              </a:rPr>
+              <a:t>。</a:t>
+            </a:r>
+            <a:r>
+              <a:rPr lang="zh-CN" altLang="en-US" b="0" i="0" dirty="0">
+                <a:solidFill>
+                  <a:srgbClr val="333333"/>
+                </a:solidFill>
+                <a:effectLst/>
+                <a:latin typeface="PingFang SC" panose="020B0400000000000000" pitchFamily="34" charset="-122"/>
+                <a:ea typeface="PingFang SC" panose="020B0400000000000000" pitchFamily="34" charset="-122"/>
+              </a:rPr>
+              <a:t>因此，卷积后</a:t>
+            </a:r>
+            <a:r>
+              <a:rPr lang="en" altLang="zh-CN" b="0" i="0" dirty="0">
+                <a:solidFill>
+                  <a:srgbClr val="333333"/>
+                </a:solidFill>
+                <a:effectLst/>
+                <a:latin typeface="PingFang SC" panose="020B0400000000000000" pitchFamily="34" charset="-122"/>
+                <a:ea typeface="PingFang SC" panose="020B0400000000000000" pitchFamily="34" charset="-122"/>
+              </a:rPr>
+              <a:t>Feature Map</a:t>
+            </a:r>
+            <a:r>
+              <a:rPr lang="zh-CN" altLang="en-US" b="0" i="0" dirty="0">
+                <a:solidFill>
+                  <a:srgbClr val="333333"/>
+                </a:solidFill>
+                <a:effectLst/>
+                <a:latin typeface="PingFang SC" panose="020B0400000000000000" pitchFamily="34" charset="-122"/>
+                <a:ea typeface="PingFang SC" panose="020B0400000000000000" pitchFamily="34" charset="-122"/>
+              </a:rPr>
+              <a:t>的深度</a:t>
+            </a:r>
+            <a:r>
+              <a:rPr lang="en-US" altLang="zh-CN" b="0" i="0" dirty="0">
+                <a:solidFill>
+                  <a:srgbClr val="333333"/>
+                </a:solidFill>
+                <a:effectLst/>
+                <a:latin typeface="PingFang SC" panose="020B0400000000000000" pitchFamily="34" charset="-122"/>
+                <a:ea typeface="PingFang SC" panose="020B0400000000000000" pitchFamily="34" charset="-122"/>
+              </a:rPr>
+              <a:t>(</a:t>
+            </a:r>
+            <a:r>
+              <a:rPr lang="zh-CN" altLang="en-US" b="0" i="0" dirty="0">
+                <a:solidFill>
+                  <a:srgbClr val="333333"/>
+                </a:solidFill>
+                <a:effectLst/>
+                <a:latin typeface="PingFang SC" panose="020B0400000000000000" pitchFamily="34" charset="-122"/>
+                <a:ea typeface="PingFang SC" panose="020B0400000000000000" pitchFamily="34" charset="-122"/>
+              </a:rPr>
+              <a:t>个数</a:t>
+            </a:r>
+            <a:r>
+              <a:rPr lang="en-US" altLang="zh-CN" b="0" i="0" dirty="0">
+                <a:solidFill>
+                  <a:srgbClr val="333333"/>
+                </a:solidFill>
+                <a:effectLst/>
+                <a:latin typeface="PingFang SC" panose="020B0400000000000000" pitchFamily="34" charset="-122"/>
+                <a:ea typeface="PingFang SC" panose="020B0400000000000000" pitchFamily="34" charset="-122"/>
+              </a:rPr>
+              <a:t>)</a:t>
+            </a:r>
+            <a:r>
+              <a:rPr lang="zh-CN" altLang="en-US" b="0" i="0" dirty="0">
+                <a:solidFill>
+                  <a:srgbClr val="333333"/>
+                </a:solidFill>
+                <a:effectLst/>
+                <a:latin typeface="PingFang SC" panose="020B0400000000000000" pitchFamily="34" charset="-122"/>
+                <a:ea typeface="PingFang SC" panose="020B0400000000000000" pitchFamily="34" charset="-122"/>
+              </a:rPr>
+              <a:t>和卷积层的</a:t>
+            </a:r>
+            <a:r>
+              <a:rPr lang="en" altLang="zh-CN" b="0" i="0" dirty="0">
+                <a:solidFill>
+                  <a:srgbClr val="333333"/>
+                </a:solidFill>
+                <a:effectLst/>
+                <a:latin typeface="PingFang SC" panose="020B0400000000000000" pitchFamily="34" charset="-122"/>
+                <a:ea typeface="PingFang SC" panose="020B0400000000000000" pitchFamily="34" charset="-122"/>
+              </a:rPr>
+              <a:t>filter</a:t>
+            </a:r>
+            <a:r>
+              <a:rPr lang="zh-CN" altLang="en-US" b="0" i="0" dirty="0">
+                <a:solidFill>
+                  <a:srgbClr val="333333"/>
+                </a:solidFill>
+                <a:effectLst/>
+                <a:latin typeface="PingFang SC" panose="020B0400000000000000" pitchFamily="34" charset="-122"/>
+                <a:ea typeface="PingFang SC" panose="020B0400000000000000" pitchFamily="34" charset="-122"/>
+              </a:rPr>
+              <a:t>个数是相同的</a:t>
+            </a:r>
+            <a:endParaRPr lang="en-US" altLang="zh-CN" b="0" i="0" dirty="0">
+              <a:solidFill>
+                <a:srgbClr val="333333"/>
+              </a:solidFill>
+              <a:effectLst/>
+              <a:latin typeface="PingFang SC" panose="020B0400000000000000" pitchFamily="34" charset="-122"/>
+              <a:ea typeface="PingFang SC" panose="020B0400000000000000" pitchFamily="34" charset="-122"/>
+            </a:endParaRPr>
+          </a:p>
+          <a:p>
+            <a:pPr marL="285750" indent="-285750">
+              <a:buFont typeface="Arial" panose="020B0604020202020204" pitchFamily="34" charset="0"/>
+              <a:buChar char="•"/>
+            </a:pPr>
+            <a:endParaRPr lang="en-US" altLang="zh-CN" b="0" i="0" dirty="0">
+              <a:solidFill>
+                <a:srgbClr val="333333"/>
+              </a:solidFill>
+              <a:effectLst/>
+              <a:latin typeface="PingFang SC" panose="020B0400000000000000" pitchFamily="34" charset="-122"/>
+              <a:ea typeface="PingFang SC" panose="020B0400000000000000" pitchFamily="34" charset="-122"/>
+            </a:endParaRPr>
           </a:p>
           <a:p>
             <a:pPr marL="285750" indent="-285750">
@@ -15402,6 +16740,732 @@
           </a:p>
         </p:txBody>
       </p:sp>
+    </p:spTree>
+    <p:custDataLst>
+      <p:tags r:id="rId1"/>
+    </p:custDataLst>
+    <p:extLst>
+      <p:ext uri="{BB962C8B-B14F-4D97-AF65-F5344CB8AC3E}">
+        <p14:creationId xmlns:p14="http://schemas.microsoft.com/office/powerpoint/2010/main" val="2115132814"/>
+      </p:ext>
+    </p:extLst>
+  </p:cSld>
+  <p:clrMapOvr>
+    <a:masterClrMapping/>
+  </p:clrMapOvr>
+  <p:timing>
+    <p:tnLst>
+      <p:par>
+        <p:cTn id="1" dur="indefinite" restart="never" nodeType="tmRoot">
+          <p:childTnLst>
+            <p:seq concurrent="1" nextAc="seek">
+              <p:cTn id="2" dur="indefinite" nodeType="mainSeq">
+                <p:childTnLst>
+                  <p:par>
+                    <p:cTn id="3" fill="hold">
+                      <p:stCondLst>
+                        <p:cond delay="indefinite"/>
+                      </p:stCondLst>
+                      <p:childTnLst>
+                        <p:par>
+                          <p:cTn id="4" fill="hold">
+                            <p:stCondLst>
+                              <p:cond delay="0"/>
+                            </p:stCondLst>
+                            <p:childTnLst>
+                              <p:par>
+                                <p:cTn id="5" presetID="1" presetClass="entr" presetSubtype="0" fill="hold" nodeType="clickEffect">
+                                  <p:stCondLst>
+                                    <p:cond delay="0"/>
+                                  </p:stCondLst>
+                                  <p:childTnLst>
+                                    <p:set>
+                                      <p:cBhvr>
+                                        <p:cTn id="6" dur="1" fill="hold">
+                                          <p:stCondLst>
+                                            <p:cond delay="0"/>
+                                          </p:stCondLst>
+                                        </p:cTn>
+                                        <p:tgtEl>
+                                          <p:spTgt spid="6">
+                                            <p:txEl>
+                                              <p:pRg st="0" end="0"/>
+                                            </p:txEl>
+                                          </p:spTgt>
+                                        </p:tgtEl>
+                                        <p:attrNameLst>
+                                          <p:attrName>style.visibility</p:attrName>
+                                        </p:attrNameLst>
+                                      </p:cBhvr>
+                                      <p:to>
+                                        <p:strVal val="visible"/>
+                                      </p:to>
+                                    </p:set>
+                                  </p:childTnLst>
+                                </p:cTn>
+                              </p:par>
+                            </p:childTnLst>
+                          </p:cTn>
+                        </p:par>
+                      </p:childTnLst>
+                    </p:cTn>
+                  </p:par>
+                </p:childTnLst>
+              </p:cTn>
+              <p:prevCondLst>
+                <p:cond evt="onPrev" delay="0">
+                  <p:tgtEl>
+                    <p:sldTgt/>
+                  </p:tgtEl>
+                </p:cond>
+              </p:prevCondLst>
+              <p:nextCondLst>
+                <p:cond evt="onNext" delay="0">
+                  <p:tgtEl>
+                    <p:sldTgt/>
+                  </p:tgtEl>
+                </p:cond>
+              </p:nextCondLst>
+            </p:seq>
+          </p:childTnLst>
+        </p:cTn>
+      </p:par>
+    </p:tnLst>
+  </p:timing>
+</p:sld>
+</file>
+
+<file path=ppt/slides/slide26.xml><?xml version="1.0" encoding="utf-8"?>
+<p:sld xmlns:a="http://schemas.openxmlformats.org/drawingml/2006/main" xmlns:r="http://schemas.openxmlformats.org/officeDocument/2006/relationships" xmlns:p="http://schemas.openxmlformats.org/presentationml/2006/main">
+  <p:cSld>
+    <p:spTree>
+      <p:nvGrpSpPr>
+        <p:cNvPr id="1" name=""/>
+        <p:cNvGrpSpPr/>
+        <p:nvPr/>
+      </p:nvGrpSpPr>
+      <p:grpSpPr>
+        <a:xfrm>
+          <a:off x="0" y="0"/>
+          <a:ext cx="0" cy="0"/>
+          <a:chOff x="0" y="0"/>
+          <a:chExt cx="0" cy="0"/>
+        </a:xfrm>
+      </p:grpSpPr>
+      <p:pic>
+        <p:nvPicPr>
+          <p:cNvPr id="1026" name="Picture 2">
+            <a:extLst>
+              <a:ext uri="{FF2B5EF4-FFF2-40B4-BE49-F238E27FC236}">
+                <a16:creationId xmlns:a16="http://schemas.microsoft.com/office/drawing/2014/main" id="{D4021A57-5293-DDB5-7006-DE31FC37121A}"/>
+              </a:ext>
+            </a:extLst>
+          </p:cNvPr>
+          <p:cNvPicPr>
+            <a:picLocks noChangeAspect="1" noChangeArrowheads="1"/>
+          </p:cNvPicPr>
+          <p:nvPr/>
+        </p:nvPicPr>
+        <p:blipFill>
+          <a:blip r:embed="rId3">
+            <a:extLst>
+              <a:ext uri="{28A0092B-C50C-407E-A947-70E740481C1C}">
+                <a14:useLocalDpi xmlns:a14="http://schemas.microsoft.com/office/drawing/2010/main" val="0"/>
+              </a:ext>
+            </a:extLst>
+          </a:blip>
+          <a:srcRect/>
+          <a:stretch>
+            <a:fillRect/>
+          </a:stretch>
+        </p:blipFill>
+        <p:spPr bwMode="auto">
+          <a:xfrm>
+            <a:off x="5587387" y="1346032"/>
+            <a:ext cx="6159138" cy="5401436"/>
+          </a:xfrm>
+          <a:prstGeom prst="rect">
+            <a:avLst/>
+          </a:prstGeom>
+          <a:noFill/>
+          <a:extLst>
+            <a:ext uri="{909E8E84-426E-40DD-AFC4-6F175D3DCCD1}">
+              <a14:hiddenFill xmlns:a14="http://schemas.microsoft.com/office/drawing/2010/main">
+                <a:solidFill>
+                  <a:srgbClr val="FFFFFF"/>
+                </a:solidFill>
+              </a14:hiddenFill>
+            </a:ext>
+          </a:extLst>
+        </p:spPr>
+      </p:pic>
+      <mc:AlternateContent xmlns:mc="http://schemas.openxmlformats.org/markup-compatibility/2006">
+        <mc:Choice xmlns:a14="http://schemas.microsoft.com/office/drawing/2010/main" Requires="a14">
+          <p:sp>
+            <p:nvSpPr>
+              <p:cNvPr id="5" name="文本框 4">
+                <a:extLst>
+                  <a:ext uri="{FF2B5EF4-FFF2-40B4-BE49-F238E27FC236}">
+                    <a16:creationId xmlns:a16="http://schemas.microsoft.com/office/drawing/2014/main" id="{22816BC0-0145-97AA-8CCD-0CDCF1EB7B34}"/>
+                  </a:ext>
+                </a:extLst>
+              </p:cNvPr>
+              <p:cNvSpPr txBox="1"/>
+              <p:nvPr/>
+            </p:nvSpPr>
+            <p:spPr>
+              <a:xfrm>
+                <a:off x="602731" y="1891480"/>
+                <a:ext cx="3938835" cy="381515"/>
+              </a:xfrm>
+              <a:prstGeom prst="rect">
+                <a:avLst/>
+              </a:prstGeom>
+              <a:noFill/>
+            </p:spPr>
+            <p:txBody>
+              <a:bodyPr wrap="none" rtlCol="0">
+                <a:spAutoFit/>
+              </a:bodyPr>
+              <a:lstStyle/>
+              <a:p>
+                <a:r>
+                  <a:rPr kumimoji="1" lang="zh-CN" altLang="en-US" dirty="0"/>
+                  <a:t>如何计算第一个</a:t>
+                </a:r>
+                <a:r>
+                  <a:rPr kumimoji="1" lang="en-US" altLang="zh-CN" dirty="0"/>
+                  <a:t>Feature Map</a:t>
+                </a:r>
+                <a:r>
+                  <a:rPr kumimoji="1" lang="zh-CN" altLang="en-US" dirty="0"/>
+                  <a:t>的</a:t>
+                </a:r>
+                <a14:m>
+                  <m:oMath xmlns:m="http://schemas.openxmlformats.org/officeDocument/2006/math">
+                    <m:sSub>
+                      <m:sSubPr>
+                        <m:ctrlPr>
+                          <a:rPr kumimoji="1" lang="en-US" altLang="zh-CN" i="1" smtClean="0">
+                            <a:latin typeface="Cambria Math" panose="02040503050406030204" pitchFamily="18" charset="0"/>
+                          </a:rPr>
+                        </m:ctrlPr>
+                      </m:sSubPr>
+                      <m:e>
+                        <m:r>
+                          <a:rPr kumimoji="1" lang="en-US" altLang="zh-CN" b="0" i="1" smtClean="0">
+                            <a:latin typeface="Cambria Math" panose="02040503050406030204" pitchFamily="18" charset="0"/>
+                          </a:rPr>
+                          <m:t>𝑎</m:t>
+                        </m:r>
+                      </m:e>
+                      <m:sub>
+                        <m:r>
+                          <a:rPr kumimoji="1" lang="en-US" altLang="zh-CN" b="0" i="1" smtClean="0">
+                            <a:latin typeface="Cambria Math" panose="02040503050406030204" pitchFamily="18" charset="0"/>
+                          </a:rPr>
+                          <m:t>0,0</m:t>
+                        </m:r>
+                      </m:sub>
+                    </m:sSub>
+                  </m:oMath>
+                </a14:m>
+                <a:r>
+                  <a:rPr kumimoji="1" lang="zh-CN" altLang="en-US" dirty="0"/>
+                  <a:t>？</a:t>
+                </a:r>
+              </a:p>
+            </p:txBody>
+          </p:sp>
+        </mc:Choice>
+        <mc:Fallback>
+          <p:sp>
+            <p:nvSpPr>
+              <p:cNvPr id="5" name="文本框 4">
+                <a:extLst>
+                  <a:ext uri="{FF2B5EF4-FFF2-40B4-BE49-F238E27FC236}">
+                    <a16:creationId xmlns:a16="http://schemas.microsoft.com/office/drawing/2014/main" id="{22816BC0-0145-97AA-8CCD-0CDCF1EB7B34}"/>
+                  </a:ext>
+                </a:extLst>
+              </p:cNvPr>
+              <p:cNvSpPr txBox="1">
+                <a:spLocks noRot="1" noChangeAspect="1" noMove="1" noResize="1" noEditPoints="1" noAdjustHandles="1" noChangeArrowheads="1" noChangeShapeType="1" noTextEdit="1"/>
+              </p:cNvSpPr>
+              <p:nvPr/>
+            </p:nvSpPr>
+            <p:spPr>
+              <a:xfrm>
+                <a:off x="602731" y="1891480"/>
+                <a:ext cx="3938835" cy="381515"/>
+              </a:xfrm>
+              <a:prstGeom prst="rect">
+                <a:avLst/>
+              </a:prstGeom>
+              <a:blipFill>
+                <a:blip r:embed="rId4"/>
+                <a:stretch>
+                  <a:fillRect l="-1286" t="-9375" r="-322" b="-15625"/>
+                </a:stretch>
+              </a:blipFill>
+            </p:spPr>
+            <p:txBody>
+              <a:bodyPr/>
+              <a:lstStyle/>
+              <a:p>
+                <a:r>
+                  <a:rPr lang="zh-CN" altLang="en-US">
+                    <a:noFill/>
+                  </a:rPr>
+                  <a:t> </a:t>
+                </a:r>
+              </a:p>
+            </p:txBody>
+          </p:sp>
+        </mc:Fallback>
+      </mc:AlternateContent>
+      <p:sp>
+        <p:nvSpPr>
+          <p:cNvPr id="7" name="文本框 6">
+            <a:extLst>
+              <a:ext uri="{FF2B5EF4-FFF2-40B4-BE49-F238E27FC236}">
+                <a16:creationId xmlns:a16="http://schemas.microsoft.com/office/drawing/2014/main" id="{C7ABE8E9-F83A-D966-2FC2-5458A880AA7D}"/>
+              </a:ext>
+            </a:extLst>
+          </p:cNvPr>
+          <p:cNvSpPr txBox="1"/>
+          <p:nvPr/>
+        </p:nvSpPr>
+        <p:spPr>
+          <a:xfrm>
+            <a:off x="582804" y="401935"/>
+            <a:ext cx="10596367" cy="1200329"/>
+          </a:xfrm>
+          <a:prstGeom prst="rect">
+            <a:avLst/>
+          </a:prstGeom>
+          <a:noFill/>
+        </p:spPr>
+        <p:txBody>
+          <a:bodyPr wrap="square" rtlCol="0">
+            <a:spAutoFit/>
+          </a:bodyPr>
+          <a:lstStyle/>
+          <a:p>
+            <a:r>
+              <a:rPr lang="zh-CN" altLang="en-US" b="0" i="0" dirty="0">
+                <a:solidFill>
+                  <a:srgbClr val="333333"/>
+                </a:solidFill>
+                <a:effectLst/>
+                <a:latin typeface="PingFang SC" panose="020B0400000000000000" pitchFamily="34" charset="-122"/>
+                <a:ea typeface="PingFang SC" panose="020B0400000000000000" pitchFamily="34" charset="-122"/>
+              </a:rPr>
+              <a:t>下面的动画显示了包含两个</a:t>
+            </a:r>
+            <a:r>
+              <a:rPr lang="en" altLang="zh-CN" b="0" i="0" dirty="0">
+                <a:solidFill>
+                  <a:srgbClr val="333333"/>
+                </a:solidFill>
+                <a:effectLst/>
+                <a:latin typeface="PingFang SC" panose="020B0400000000000000" pitchFamily="34" charset="-122"/>
+                <a:ea typeface="PingFang SC" panose="020B0400000000000000" pitchFamily="34" charset="-122"/>
+              </a:rPr>
+              <a:t>filter</a:t>
+            </a:r>
+            <a:r>
+              <a:rPr lang="zh-CN" altLang="en-US" b="0" i="0" dirty="0">
+                <a:solidFill>
+                  <a:srgbClr val="333333"/>
+                </a:solidFill>
+                <a:effectLst/>
+                <a:latin typeface="PingFang SC" panose="020B0400000000000000" pitchFamily="34" charset="-122"/>
+                <a:ea typeface="PingFang SC" panose="020B0400000000000000" pitchFamily="34" charset="-122"/>
+              </a:rPr>
+              <a:t>的卷积层的计算</a:t>
+            </a:r>
+            <a:endParaRPr lang="en-US" altLang="zh-CN" b="0" i="0" dirty="0">
+              <a:solidFill>
+                <a:srgbClr val="333333"/>
+              </a:solidFill>
+              <a:effectLst/>
+              <a:latin typeface="PingFang SC" panose="020B0400000000000000" pitchFamily="34" charset="-122"/>
+              <a:ea typeface="PingFang SC" panose="020B0400000000000000" pitchFamily="34" charset="-122"/>
+            </a:endParaRPr>
+          </a:p>
+          <a:p>
+            <a:r>
+              <a:rPr lang="en-US" altLang="zh-CN" b="0" i="0" dirty="0">
+                <a:solidFill>
+                  <a:srgbClr val="333333"/>
+                </a:solidFill>
+                <a:effectLst/>
+                <a:latin typeface="PingFang SC" panose="020B0400000000000000" pitchFamily="34" charset="-122"/>
+                <a:ea typeface="PingFang SC" panose="020B0400000000000000" pitchFamily="34" charset="-122"/>
+              </a:rPr>
+              <a:t>7*7*3</a:t>
+            </a:r>
+            <a:r>
+              <a:rPr lang="zh-CN" altLang="en-US" b="0" i="0" dirty="0">
+                <a:solidFill>
+                  <a:srgbClr val="333333"/>
+                </a:solidFill>
+                <a:effectLst/>
+                <a:latin typeface="PingFang SC" panose="020B0400000000000000" pitchFamily="34" charset="-122"/>
+                <a:ea typeface="PingFang SC" panose="020B0400000000000000" pitchFamily="34" charset="-122"/>
+              </a:rPr>
+              <a:t>输入</a:t>
+            </a:r>
+            <a:r>
+              <a:rPr lang="en-US" altLang="zh-CN" b="0" i="0" dirty="0">
+                <a:solidFill>
+                  <a:srgbClr val="333333"/>
+                </a:solidFill>
+                <a:effectLst/>
+                <a:latin typeface="PingFang SC" panose="020B0400000000000000" pitchFamily="34" charset="-122"/>
+                <a:ea typeface="PingFang SC" panose="020B0400000000000000" pitchFamily="34" charset="-122"/>
+              </a:rPr>
+              <a:t>-&gt;</a:t>
+            </a:r>
+            <a:r>
+              <a:rPr lang="zh-CN" altLang="en-US" b="0" i="0" dirty="0">
+                <a:solidFill>
+                  <a:srgbClr val="333333"/>
+                </a:solidFill>
+                <a:effectLst/>
+                <a:latin typeface="PingFang SC" panose="020B0400000000000000" pitchFamily="34" charset="-122"/>
+                <a:ea typeface="PingFang SC" panose="020B0400000000000000" pitchFamily="34" charset="-122"/>
+              </a:rPr>
+              <a:t>经过两个</a:t>
+            </a:r>
+            <a:r>
+              <a:rPr lang="en-US" altLang="zh-CN" b="0" i="0" dirty="0">
+                <a:solidFill>
+                  <a:srgbClr val="333333"/>
+                </a:solidFill>
+                <a:effectLst/>
+                <a:latin typeface="PingFang SC" panose="020B0400000000000000" pitchFamily="34" charset="-122"/>
+                <a:ea typeface="PingFang SC" panose="020B0400000000000000" pitchFamily="34" charset="-122"/>
+              </a:rPr>
+              <a:t>3*3*3</a:t>
+            </a:r>
+            <a:r>
+              <a:rPr lang="en" altLang="zh-CN" b="0" i="0" dirty="0">
+                <a:solidFill>
+                  <a:srgbClr val="333333"/>
+                </a:solidFill>
+                <a:effectLst/>
+                <a:latin typeface="PingFang SC" panose="020B0400000000000000" pitchFamily="34" charset="-122"/>
+                <a:ea typeface="PingFang SC" panose="020B0400000000000000" pitchFamily="34" charset="-122"/>
+              </a:rPr>
+              <a:t>filter</a:t>
+            </a:r>
+            <a:r>
+              <a:rPr lang="zh-CN" altLang="en-US" b="0" i="0" dirty="0">
+                <a:solidFill>
+                  <a:srgbClr val="333333"/>
+                </a:solidFill>
+                <a:effectLst/>
+                <a:latin typeface="PingFang SC" panose="020B0400000000000000" pitchFamily="34" charset="-122"/>
+                <a:ea typeface="PingFang SC" panose="020B0400000000000000" pitchFamily="34" charset="-122"/>
+              </a:rPr>
+              <a:t> </a:t>
+            </a:r>
+            <a:r>
+              <a:rPr lang="en-US" altLang="zh-CN" b="0" i="0" dirty="0">
+                <a:solidFill>
+                  <a:srgbClr val="333333"/>
+                </a:solidFill>
+                <a:effectLst/>
+                <a:latin typeface="PingFang SC" panose="020B0400000000000000" pitchFamily="34" charset="-122"/>
+                <a:ea typeface="PingFang SC" panose="020B0400000000000000" pitchFamily="34" charset="-122"/>
+              </a:rPr>
+              <a:t>(</a:t>
+            </a:r>
+            <a:r>
+              <a:rPr lang="zh-CN" altLang="en-US" b="0" i="0" dirty="0">
+                <a:solidFill>
+                  <a:srgbClr val="333333"/>
+                </a:solidFill>
+                <a:effectLst/>
+                <a:latin typeface="PingFang SC" panose="020B0400000000000000" pitchFamily="34" charset="-122"/>
+                <a:ea typeface="PingFang SC" panose="020B0400000000000000" pitchFamily="34" charset="-122"/>
+              </a:rPr>
+              <a:t>步幅为</a:t>
+            </a:r>
+            <a:r>
+              <a:rPr lang="en-US" altLang="zh-CN" b="0" i="0" dirty="0">
+                <a:solidFill>
+                  <a:srgbClr val="333333"/>
+                </a:solidFill>
+                <a:effectLst/>
+                <a:latin typeface="PingFang SC" panose="020B0400000000000000" pitchFamily="34" charset="-122"/>
+                <a:ea typeface="PingFang SC" panose="020B0400000000000000" pitchFamily="34" charset="-122"/>
+              </a:rPr>
+              <a:t>2)</a:t>
+            </a:r>
+            <a:r>
+              <a:rPr lang="en-US" altLang="zh-CN" dirty="0">
+                <a:solidFill>
+                  <a:srgbClr val="333333"/>
+                </a:solidFill>
+                <a:latin typeface="PingFang SC" panose="020B0400000000000000" pitchFamily="34" charset="-122"/>
+                <a:ea typeface="PingFang SC" panose="020B0400000000000000" pitchFamily="34" charset="-122"/>
+              </a:rPr>
+              <a:t>-&gt;</a:t>
+            </a:r>
+            <a:r>
+              <a:rPr lang="zh-CN" altLang="en-US" b="0" i="0" dirty="0">
+                <a:solidFill>
+                  <a:srgbClr val="333333"/>
+                </a:solidFill>
+                <a:effectLst/>
+                <a:latin typeface="PingFang SC" panose="020B0400000000000000" pitchFamily="34" charset="-122"/>
+                <a:ea typeface="PingFang SC" panose="020B0400000000000000" pitchFamily="34" charset="-122"/>
+              </a:rPr>
+              <a:t>得到了</a:t>
+            </a:r>
+            <a:r>
+              <a:rPr lang="en-US" altLang="zh-CN" b="0" i="0" dirty="0">
+                <a:solidFill>
+                  <a:srgbClr val="333333"/>
+                </a:solidFill>
+                <a:effectLst/>
+                <a:latin typeface="PingFang SC" panose="020B0400000000000000" pitchFamily="34" charset="-122"/>
+                <a:ea typeface="PingFang SC" panose="020B0400000000000000" pitchFamily="34" charset="-122"/>
+              </a:rPr>
+              <a:t>3*3*2</a:t>
+            </a:r>
+            <a:r>
+              <a:rPr lang="zh-CN" altLang="en-US" b="0" i="0" dirty="0">
+                <a:solidFill>
+                  <a:srgbClr val="333333"/>
+                </a:solidFill>
+                <a:effectLst/>
+                <a:latin typeface="PingFang SC" panose="020B0400000000000000" pitchFamily="34" charset="-122"/>
+                <a:ea typeface="PingFang SC" panose="020B0400000000000000" pitchFamily="34" charset="-122"/>
+              </a:rPr>
+              <a:t>的输出</a:t>
+            </a:r>
+            <a:endParaRPr lang="en-US" altLang="zh-CN" b="0" i="0" dirty="0">
+              <a:solidFill>
+                <a:srgbClr val="333333"/>
+              </a:solidFill>
+              <a:effectLst/>
+              <a:latin typeface="PingFang SC" panose="020B0400000000000000" pitchFamily="34" charset="-122"/>
+              <a:ea typeface="PingFang SC" panose="020B0400000000000000" pitchFamily="34" charset="-122"/>
+            </a:endParaRPr>
+          </a:p>
+          <a:p>
+            <a:r>
+              <a:rPr lang="zh-CN" altLang="en-US" b="0" i="0" dirty="0">
+                <a:solidFill>
+                  <a:srgbClr val="333333"/>
+                </a:solidFill>
+                <a:effectLst/>
+                <a:latin typeface="PingFang SC" panose="020B0400000000000000" pitchFamily="34" charset="-122"/>
+                <a:ea typeface="PingFang SC" panose="020B0400000000000000" pitchFamily="34" charset="-122"/>
+              </a:rPr>
+              <a:t>另外我们也会看到下图的</a:t>
+            </a:r>
+            <a:r>
+              <a:rPr lang="en" altLang="zh-CN" b="0" i="0" dirty="0">
+                <a:solidFill>
+                  <a:srgbClr val="333333"/>
+                </a:solidFill>
+                <a:effectLst/>
+                <a:latin typeface="PingFang SC" panose="020B0400000000000000" pitchFamily="34" charset="-122"/>
+                <a:ea typeface="PingFang SC" panose="020B0400000000000000" pitchFamily="34" charset="-122"/>
+              </a:rPr>
+              <a:t>Zero padding</a:t>
+            </a:r>
+            <a:r>
+              <a:rPr lang="zh-CN" altLang="en-US" b="0" i="0" dirty="0">
+                <a:solidFill>
+                  <a:srgbClr val="333333"/>
+                </a:solidFill>
+                <a:effectLst/>
+                <a:latin typeface="PingFang SC" panose="020B0400000000000000" pitchFamily="34" charset="-122"/>
+                <a:ea typeface="PingFang SC" panose="020B0400000000000000" pitchFamily="34" charset="-122"/>
+              </a:rPr>
+              <a:t>是</a:t>
+            </a:r>
+            <a:r>
+              <a:rPr lang="en-US" altLang="zh-CN" b="0" i="0" dirty="0">
+                <a:solidFill>
+                  <a:srgbClr val="333333"/>
+                </a:solidFill>
+                <a:effectLst/>
+                <a:latin typeface="PingFang SC" panose="020B0400000000000000" pitchFamily="34" charset="-122"/>
+                <a:ea typeface="PingFang SC" panose="020B0400000000000000" pitchFamily="34" charset="-122"/>
+              </a:rPr>
+              <a:t>1</a:t>
+            </a:r>
+            <a:r>
+              <a:rPr lang="zh-CN" altLang="en-US" b="0" i="0" dirty="0">
+                <a:solidFill>
+                  <a:srgbClr val="333333"/>
+                </a:solidFill>
+                <a:effectLst/>
+                <a:latin typeface="PingFang SC" panose="020B0400000000000000" pitchFamily="34" charset="-122"/>
+                <a:ea typeface="PingFang SC" panose="020B0400000000000000" pitchFamily="34" charset="-122"/>
+              </a:rPr>
+              <a:t>，也就是在输入元素的周围补了一圈</a:t>
+            </a:r>
+            <a:r>
+              <a:rPr lang="en-US" altLang="zh-CN" b="0" i="0" dirty="0">
+                <a:solidFill>
+                  <a:srgbClr val="333333"/>
+                </a:solidFill>
+                <a:effectLst/>
+                <a:latin typeface="PingFang SC" panose="020B0400000000000000" pitchFamily="34" charset="-122"/>
+                <a:ea typeface="PingFang SC" panose="020B0400000000000000" pitchFamily="34" charset="-122"/>
+              </a:rPr>
+              <a:t>0</a:t>
+            </a:r>
+            <a:endParaRPr lang="en-US" altLang="zh-CN" dirty="0"/>
+          </a:p>
+          <a:p>
+            <a:endParaRPr kumimoji="1" lang="zh-CN" altLang="en-US" dirty="0"/>
+          </a:p>
+        </p:txBody>
+      </p:sp>
+      <mc:AlternateContent xmlns:mc="http://schemas.openxmlformats.org/markup-compatibility/2006">
+        <mc:Choice xmlns:a14="http://schemas.microsoft.com/office/drawing/2010/main" Requires="a14">
+          <p:sp>
+            <p:nvSpPr>
+              <p:cNvPr id="8" name="文本框 7">
+                <a:extLst>
+                  <a:ext uri="{FF2B5EF4-FFF2-40B4-BE49-F238E27FC236}">
+                    <a16:creationId xmlns:a16="http://schemas.microsoft.com/office/drawing/2014/main" id="{FDA7E29B-9334-35C3-0342-AB6409C9EA45}"/>
+                  </a:ext>
+                </a:extLst>
+              </p:cNvPr>
+              <p:cNvSpPr txBox="1"/>
+              <p:nvPr/>
+            </p:nvSpPr>
+            <p:spPr>
+              <a:xfrm>
+                <a:off x="551435" y="2754027"/>
+                <a:ext cx="3990131" cy="381515"/>
+              </a:xfrm>
+              <a:prstGeom prst="rect">
+                <a:avLst/>
+              </a:prstGeom>
+              <a:noFill/>
+            </p:spPr>
+            <p:txBody>
+              <a:bodyPr wrap="none" rtlCol="0">
+                <a:spAutoFit/>
+              </a:bodyPr>
+              <a:lstStyle/>
+              <a:p>
+                <a:r>
+                  <a:rPr kumimoji="1" lang="zh-CN" altLang="en-US" dirty="0"/>
+                  <a:t>如何计算第二个</a:t>
+                </a:r>
+                <a:r>
+                  <a:rPr kumimoji="1" lang="en-US" altLang="zh-CN" dirty="0"/>
+                  <a:t>Feature Map</a:t>
+                </a:r>
+                <a:r>
+                  <a:rPr kumimoji="1" lang="zh-CN" altLang="en-US" dirty="0"/>
+                  <a:t>的</a:t>
+                </a:r>
+                <a14:m>
+                  <m:oMath xmlns:m="http://schemas.openxmlformats.org/officeDocument/2006/math">
+                    <m:sSub>
+                      <m:sSubPr>
+                        <m:ctrlPr>
+                          <a:rPr kumimoji="1" lang="en-US" altLang="zh-CN" i="1" smtClean="0">
+                            <a:latin typeface="Cambria Math" panose="02040503050406030204" pitchFamily="18" charset="0"/>
+                          </a:rPr>
+                        </m:ctrlPr>
+                      </m:sSubPr>
+                      <m:e>
+                        <m:r>
+                          <a:rPr kumimoji="1" lang="en-US" altLang="zh-CN" b="0" i="1" smtClean="0">
+                            <a:latin typeface="Cambria Math" panose="02040503050406030204" pitchFamily="18" charset="0"/>
+                          </a:rPr>
+                          <m:t>𝑎</m:t>
+                        </m:r>
+                      </m:e>
+                      <m:sub>
+                        <m:r>
+                          <a:rPr kumimoji="1" lang="en-US" altLang="zh-CN" b="0" i="1" smtClean="0">
+                            <a:latin typeface="Cambria Math" panose="02040503050406030204" pitchFamily="18" charset="0"/>
+                          </a:rPr>
+                          <m:t>0</m:t>
+                        </m:r>
+                        <m:r>
+                          <a:rPr kumimoji="1" lang="en-US" altLang="zh-CN" b="0" i="1" smtClean="0">
+                            <a:latin typeface="Cambria Math" panose="02040503050406030204" pitchFamily="18" charset="0"/>
+                          </a:rPr>
+                          <m:t>,1</m:t>
+                        </m:r>
+                      </m:sub>
+                    </m:sSub>
+                    <m:r>
+                      <a:rPr kumimoji="1" lang="en-US" altLang="zh-CN" b="0" i="1" smtClean="0">
+                        <a:latin typeface="Cambria Math" panose="02040503050406030204" pitchFamily="18" charset="0"/>
+                      </a:rPr>
+                      <m:t> </m:t>
+                    </m:r>
+                  </m:oMath>
+                </a14:m>
+                <a:r>
+                  <a:rPr kumimoji="1" lang="zh-CN" altLang="en-US" dirty="0"/>
+                  <a:t>？</a:t>
+                </a:r>
+              </a:p>
+            </p:txBody>
+          </p:sp>
+        </mc:Choice>
+        <mc:Fallback>
+          <p:sp>
+            <p:nvSpPr>
+              <p:cNvPr id="8" name="文本框 7">
+                <a:extLst>
+                  <a:ext uri="{FF2B5EF4-FFF2-40B4-BE49-F238E27FC236}">
+                    <a16:creationId xmlns:a16="http://schemas.microsoft.com/office/drawing/2014/main" id="{FDA7E29B-9334-35C3-0342-AB6409C9EA45}"/>
+                  </a:ext>
+                </a:extLst>
+              </p:cNvPr>
+              <p:cNvSpPr txBox="1">
+                <a:spLocks noRot="1" noChangeAspect="1" noMove="1" noResize="1" noEditPoints="1" noAdjustHandles="1" noChangeArrowheads="1" noChangeShapeType="1" noTextEdit="1"/>
+              </p:cNvSpPr>
+              <p:nvPr/>
+            </p:nvSpPr>
+            <p:spPr>
+              <a:xfrm>
+                <a:off x="551435" y="2754027"/>
+                <a:ext cx="3990131" cy="381515"/>
+              </a:xfrm>
+              <a:prstGeom prst="rect">
+                <a:avLst/>
+              </a:prstGeom>
+              <a:blipFill>
+                <a:blip r:embed="rId5"/>
+                <a:stretch>
+                  <a:fillRect l="-1270" t="-9677" r="-317" b="-19355"/>
+                </a:stretch>
+              </a:blipFill>
+            </p:spPr>
+            <p:txBody>
+              <a:bodyPr/>
+              <a:lstStyle/>
+              <a:p>
+                <a:r>
+                  <a:rPr lang="zh-CN" altLang="en-US">
+                    <a:noFill/>
+                  </a:rPr>
+                  <a:t> </a:t>
+                </a:r>
+              </a:p>
+            </p:txBody>
+          </p:sp>
+        </mc:Fallback>
+      </mc:AlternateContent>
     </p:spTree>
     <p:custDataLst>
       <p:tags r:id="rId1"/>
@@ -15415,10 +17479,225 @@
   <p:clrMapOvr>
     <a:masterClrMapping/>
   </p:clrMapOvr>
+  <p:timing>
+    <p:tnLst>
+      <p:par>
+        <p:cTn id="1" dur="indefinite" restart="never" nodeType="tmRoot">
+          <p:childTnLst>
+            <p:seq concurrent="1" nextAc="seek">
+              <p:cTn id="2" dur="indefinite" nodeType="mainSeq">
+                <p:childTnLst>
+                  <p:par>
+                    <p:cTn id="3" fill="hold">
+                      <p:stCondLst>
+                        <p:cond delay="indefinite"/>
+                      </p:stCondLst>
+                      <p:childTnLst>
+                        <p:par>
+                          <p:cTn id="4" fill="hold">
+                            <p:stCondLst>
+                              <p:cond delay="0"/>
+                            </p:stCondLst>
+                            <p:childTnLst>
+                              <p:par>
+                                <p:cTn id="5" presetID="1" presetClass="entr" presetSubtype="0" fill="hold" grpId="0" nodeType="clickEffect">
+                                  <p:stCondLst>
+                                    <p:cond delay="0"/>
+                                  </p:stCondLst>
+                                  <p:childTnLst>
+                                    <p:set>
+                                      <p:cBhvr>
+                                        <p:cTn id="6" dur="1" fill="hold">
+                                          <p:stCondLst>
+                                            <p:cond delay="0"/>
+                                          </p:stCondLst>
+                                        </p:cTn>
+                                        <p:tgtEl>
+                                          <p:spTgt spid="7"/>
+                                        </p:tgtEl>
+                                        <p:attrNameLst>
+                                          <p:attrName>style.visibility</p:attrName>
+                                        </p:attrNameLst>
+                                      </p:cBhvr>
+                                      <p:to>
+                                        <p:strVal val="visible"/>
+                                      </p:to>
+                                    </p:set>
+                                  </p:childTnLst>
+                                </p:cTn>
+                              </p:par>
+                            </p:childTnLst>
+                          </p:cTn>
+                        </p:par>
+                      </p:childTnLst>
+                    </p:cTn>
+                  </p:par>
+                  <p:par>
+                    <p:cTn id="7" fill="hold">
+                      <p:stCondLst>
+                        <p:cond delay="indefinite"/>
+                      </p:stCondLst>
+                      <p:childTnLst>
+                        <p:par>
+                          <p:cTn id="8" fill="hold">
+                            <p:stCondLst>
+                              <p:cond delay="0"/>
+                            </p:stCondLst>
+                            <p:childTnLst>
+                              <p:par>
+                                <p:cTn id="9" presetID="1" presetClass="entr" presetSubtype="0" fill="hold" nodeType="clickEffect">
+                                  <p:stCondLst>
+                                    <p:cond delay="0"/>
+                                  </p:stCondLst>
+                                  <p:childTnLst>
+                                    <p:set>
+                                      <p:cBhvr>
+                                        <p:cTn id="10" dur="1" fill="hold">
+                                          <p:stCondLst>
+                                            <p:cond delay="0"/>
+                                          </p:stCondLst>
+                                        </p:cTn>
+                                        <p:tgtEl>
+                                          <p:spTgt spid="1026"/>
+                                        </p:tgtEl>
+                                        <p:attrNameLst>
+                                          <p:attrName>style.visibility</p:attrName>
+                                        </p:attrNameLst>
+                                      </p:cBhvr>
+                                      <p:to>
+                                        <p:strVal val="visible"/>
+                                      </p:to>
+                                    </p:set>
+                                  </p:childTnLst>
+                                </p:cTn>
+                              </p:par>
+                            </p:childTnLst>
+                          </p:cTn>
+                        </p:par>
+                      </p:childTnLst>
+                    </p:cTn>
+                  </p:par>
+                  <p:par>
+                    <p:cTn id="11" fill="hold">
+                      <p:stCondLst>
+                        <p:cond delay="indefinite"/>
+                      </p:stCondLst>
+                      <p:childTnLst>
+                        <p:par>
+                          <p:cTn id="12" fill="hold">
+                            <p:stCondLst>
+                              <p:cond delay="0"/>
+                            </p:stCondLst>
+                            <p:childTnLst>
+                              <p:par>
+                                <p:cTn id="13" presetID="1" presetClass="entr" presetSubtype="0" fill="hold" grpId="0" nodeType="clickEffect">
+                                  <p:stCondLst>
+                                    <p:cond delay="0"/>
+                                  </p:stCondLst>
+                                  <p:childTnLst>
+                                    <p:set>
+                                      <p:cBhvr>
+                                        <p:cTn id="14" dur="1" fill="hold">
+                                          <p:stCondLst>
+                                            <p:cond delay="0"/>
+                                          </p:stCondLst>
+                                        </p:cTn>
+                                        <p:tgtEl>
+                                          <p:spTgt spid="5"/>
+                                        </p:tgtEl>
+                                        <p:attrNameLst>
+                                          <p:attrName>style.visibility</p:attrName>
+                                        </p:attrNameLst>
+                                      </p:cBhvr>
+                                      <p:to>
+                                        <p:strVal val="visible"/>
+                                      </p:to>
+                                    </p:set>
+                                  </p:childTnLst>
+                                </p:cTn>
+                              </p:par>
+                            </p:childTnLst>
+                          </p:cTn>
+                        </p:par>
+                      </p:childTnLst>
+                    </p:cTn>
+                  </p:par>
+                  <p:par>
+                    <p:cTn id="15" fill="hold">
+                      <p:stCondLst>
+                        <p:cond delay="indefinite"/>
+                      </p:stCondLst>
+                      <p:childTnLst>
+                        <p:par>
+                          <p:cTn id="16" fill="hold">
+                            <p:stCondLst>
+                              <p:cond delay="0"/>
+                            </p:stCondLst>
+                            <p:childTnLst>
+                              <p:par>
+                                <p:cTn id="17" presetID="1" presetClass="entr" presetSubtype="0" fill="hold" grpId="0" nodeType="clickEffect">
+                                  <p:stCondLst>
+                                    <p:cond delay="0"/>
+                                  </p:stCondLst>
+                                  <p:childTnLst>
+                                    <p:set>
+                                      <p:cBhvr>
+                                        <p:cTn id="18" dur="1" fill="hold">
+                                          <p:stCondLst>
+                                            <p:cond delay="0"/>
+                                          </p:stCondLst>
+                                        </p:cTn>
+                                        <p:tgtEl>
+                                          <p:spTgt spid="8"/>
+                                        </p:tgtEl>
+                                        <p:attrNameLst>
+                                          <p:attrName>style.visibility</p:attrName>
+                                        </p:attrNameLst>
+                                      </p:cBhvr>
+                                      <p:to>
+                                        <p:strVal val="visible"/>
+                                      </p:to>
+                                    </p:set>
+                                  </p:childTnLst>
+                                </p:cTn>
+                              </p:par>
+                            </p:childTnLst>
+                          </p:cTn>
+                        </p:par>
+                      </p:childTnLst>
+                    </p:cTn>
+                  </p:par>
+                </p:childTnLst>
+              </p:cTn>
+              <p:prevCondLst>
+                <p:cond evt="onPrev" delay="0">
+                  <p:tgtEl>
+                    <p:sldTgt/>
+                  </p:tgtEl>
+                </p:cond>
+              </p:prevCondLst>
+              <p:nextCondLst>
+                <p:cond evt="onNext" delay="0">
+                  <p:tgtEl>
+                    <p:sldTgt/>
+                  </p:tgtEl>
+                </p:cond>
+              </p:nextCondLst>
+            </p:seq>
+          </p:childTnLst>
+        </p:cTn>
+      </p:par>
+    </p:tnLst>
+    <p:bldLst>
+      <p:bldP spid="5" grpId="0"/>
+      <p:bldP spid="7" grpId="0"/>
+      <p:bldP spid="8" grpId="0"/>
+    </p:bldLst>
+  </p:timing>
 </p:sld>
 </file>
 
-<file path=ppt/slides/slide26.xml><?xml version="1.0" encoding="utf-8"?>
+<file path=ppt/slides/slide27.xml><?xml version="1.0" encoding="utf-8"?>
 <p:sld xmlns:a="http://schemas.openxmlformats.org/drawingml/2006/main" xmlns:r="http://schemas.openxmlformats.org/officeDocument/2006/relationships" xmlns:p="http://schemas.openxmlformats.org/presentationml/2006/main">
   <p:cSld>
     <p:spTree>
@@ -15452,7 +17731,7 @@
           <a:p>
             <a:r>
               <a:rPr lang="zh-CN" altLang="en-US" dirty="0"/>
-              <a:t>主问题：如何推导卷积层的前向传播？</a:t>
+              <a:t>结学</a:t>
             </a:r>
             <a:endParaRPr dirty="0">
               <a:sym typeface="+mn-ea"/>
@@ -15693,6 +17972,10 @@
               <a:buFont typeface="Arial" panose="020B0604020202020204" pitchFamily="34" charset="0"/>
               <a:buChar char="•"/>
             </a:pPr>
+            <a:r>
+              <a:rPr lang="zh-CN" altLang="en-US" dirty="0"/>
+              <a:t>如何推导卷积层的前向传播？</a:t>
+            </a:r>
             <a:endParaRPr lang="en-US" altLang="zh-CN" dirty="0"/>
           </a:p>
           <a:p>
@@ -15705,7 +17988,7 @@
             </a:pPr>
             <a:r>
               <a:rPr lang="zh-CN" altLang="en-US" dirty="0"/>
-              <a:t>自学、互学、展学</a:t>
+              <a:t>自学、展学</a:t>
             </a:r>
           </a:p>
           <a:p>
@@ -15779,7 +18062,147 @@
     </p:custDataLst>
     <p:extLst>
       <p:ext uri="{BB962C8B-B14F-4D97-AF65-F5344CB8AC3E}">
-        <p14:creationId xmlns:p14="http://schemas.microsoft.com/office/powerpoint/2010/main" val="1257455801"/>
+        <p14:creationId xmlns:p14="http://schemas.microsoft.com/office/powerpoint/2010/main" val="640168469"/>
+      </p:ext>
+    </p:extLst>
+  </p:cSld>
+  <p:clrMapOvr>
+    <a:masterClrMapping/>
+  </p:clrMapOvr>
+  <p:timing>
+    <p:tnLst>
+      <p:par>
+        <p:cTn id="1" dur="indefinite" restart="never" nodeType="tmRoot">
+          <p:childTnLst>
+            <p:seq concurrent="1" nextAc="seek">
+              <p:cTn id="2" dur="indefinite" nodeType="mainSeq">
+                <p:childTnLst>
+                  <p:par>
+                    <p:cTn id="3" fill="hold">
+                      <p:stCondLst>
+                        <p:cond delay="indefinite"/>
+                      </p:stCondLst>
+                      <p:childTnLst>
+                        <p:par>
+                          <p:cTn id="4" fill="hold">
+                            <p:stCondLst>
+                              <p:cond delay="0"/>
+                            </p:stCondLst>
+                            <p:childTnLst>
+                              <p:par>
+                                <p:cTn id="5" presetID="1" presetClass="entr" presetSubtype="0" fill="hold" nodeType="clickEffect">
+                                  <p:stCondLst>
+                                    <p:cond delay="0"/>
+                                  </p:stCondLst>
+                                  <p:childTnLst>
+                                    <p:set>
+                                      <p:cBhvr>
+                                        <p:cTn id="6" dur="1" fill="hold">
+                                          <p:stCondLst>
+                                            <p:cond delay="0"/>
+                                          </p:stCondLst>
+                                        </p:cTn>
+                                        <p:tgtEl>
+                                          <p:spTgt spid="6">
+                                            <p:txEl>
+                                              <p:pRg st="0" end="0"/>
+                                            </p:txEl>
+                                          </p:spTgt>
+                                        </p:tgtEl>
+                                        <p:attrNameLst>
+                                          <p:attrName>style.visibility</p:attrName>
+                                        </p:attrNameLst>
+                                      </p:cBhvr>
+                                      <p:to>
+                                        <p:strVal val="visible"/>
+                                      </p:to>
+                                    </p:set>
+                                  </p:childTnLst>
+                                </p:cTn>
+                              </p:par>
+                            </p:childTnLst>
+                          </p:cTn>
+                        </p:par>
+                      </p:childTnLst>
+                    </p:cTn>
+                  </p:par>
+                </p:childTnLst>
+              </p:cTn>
+              <p:prevCondLst>
+                <p:cond evt="onPrev" delay="0">
+                  <p:tgtEl>
+                    <p:sldTgt/>
+                  </p:tgtEl>
+                </p:cond>
+              </p:prevCondLst>
+              <p:nextCondLst>
+                <p:cond evt="onNext" delay="0">
+                  <p:tgtEl>
+                    <p:sldTgt/>
+                  </p:tgtEl>
+                </p:cond>
+              </p:nextCondLst>
+            </p:seq>
+          </p:childTnLst>
+        </p:cTn>
+      </p:par>
+    </p:tnLst>
+  </p:timing>
+</p:sld>
+</file>
+
+<file path=ppt/slides/slide28.xml><?xml version="1.0" encoding="utf-8"?>
+<p:sld xmlns:a="http://schemas.openxmlformats.org/drawingml/2006/main" xmlns:r="http://schemas.openxmlformats.org/officeDocument/2006/relationships" xmlns:p="http://schemas.openxmlformats.org/presentationml/2006/main">
+  <p:cSld>
+    <p:spTree>
+      <p:nvGrpSpPr>
+        <p:cNvPr id="1" name=""/>
+        <p:cNvGrpSpPr/>
+        <p:nvPr/>
+      </p:nvGrpSpPr>
+      <p:grpSpPr>
+        <a:xfrm>
+          <a:off x="0" y="0"/>
+          <a:ext cx="0" cy="0"/>
+          <a:chOff x="0" y="0"/>
+          <a:chExt cx="0" cy="0"/>
+        </a:xfrm>
+      </p:grpSpPr>
+      <p:sp>
+        <p:nvSpPr>
+          <p:cNvPr id="2" name="标题 1"/>
+          <p:cNvSpPr>
+            <a:spLocks noGrp="1"/>
+          </p:cNvSpPr>
+          <p:nvPr>
+            <p:ph type="title"/>
+          </p:nvPr>
+        </p:nvSpPr>
+        <p:spPr/>
+        <p:txBody>
+          <a:bodyPr/>
+          <a:lstStyle/>
+          <a:p>
+            <a:r>
+              <a:rPr lang="zh-CN" altLang="en-US" dirty="0">
+                <a:sym typeface="+mn-ea"/>
+              </a:rPr>
+              <a:t>任务：实现</a:t>
+            </a:r>
+            <a:r>
+              <a:rPr lang="zh-CN" altLang="en-US" dirty="0"/>
+              <a:t>卷积层的前向传播</a:t>
+            </a:r>
+          </a:p>
+        </p:txBody>
+      </p:sp>
+    </p:spTree>
+    <p:custDataLst>
+      <p:tags r:id="rId1"/>
+    </p:custDataLst>
+    <p:extLst>
+      <p:ext uri="{BB962C8B-B14F-4D97-AF65-F5344CB8AC3E}">
+        <p14:creationId xmlns:p14="http://schemas.microsoft.com/office/powerpoint/2010/main" val="973807582"/>
       </p:ext>
     </p:extLst>
   </p:cSld>
@@ -15789,7 +18212,7 @@
 </p:sld>
 </file>
 
-<file path=ppt/slides/slide27.xml><?xml version="1.0" encoding="utf-8"?>
+<file path=ppt/slides/slide29.xml><?xml version="1.0" encoding="utf-8"?>
 <p:sld xmlns:a="http://schemas.openxmlformats.org/drawingml/2006/main" xmlns:r="http://schemas.openxmlformats.org/officeDocument/2006/relationships" xmlns:p="http://schemas.openxmlformats.org/presentationml/2006/main">
   <p:cSld>
     <p:spTree>
@@ -15822,8 +18245,14 @@
           <a:lstStyle/>
           <a:p>
             <a:r>
+              <a:rPr lang="zh-CN" altLang="en-US" dirty="0">
+                <a:sym typeface="+mn-ea"/>
+              </a:rPr>
+              <a:t>任务：实现</a:t>
+            </a:r>
+            <a:r>
               <a:rPr lang="zh-CN" altLang="en-US" dirty="0"/>
-              <a:t>主问题：如何推导卷积层的前向传播？</a:t>
+              <a:t>卷积层的前向传播</a:t>
             </a:r>
             <a:endParaRPr dirty="0">
               <a:sym typeface="+mn-ea"/>
@@ -16064,19 +18493,42 @@
               <a:buFont typeface="Arial" panose="020B0604020202020204" pitchFamily="34" charset="0"/>
               <a:buChar char="•"/>
             </a:pPr>
+            <a:r>
+              <a:rPr lang="zh-CN" altLang="en-US" dirty="0"/>
+              <a:t>请实现卷积层的前向传播？</a:t>
+            </a:r>
             <a:endParaRPr lang="en-US" altLang="zh-CN" dirty="0"/>
           </a:p>
           <a:p>
+            <a:pPr marL="285750" indent="-285750">
+              <a:buFont typeface="Arial" panose="020B0604020202020204" pitchFamily="34" charset="0"/>
+              <a:buChar char="•"/>
+            </a:pPr>
+            <a:r>
+              <a:rPr lang="zh-CN" altLang="en-US" dirty="0"/>
+              <a:t>请运行</a:t>
+            </a:r>
+            <a:r>
+              <a:rPr lang="en-US" altLang="zh-CN" dirty="0" err="1"/>
+              <a:t>ConvLayer</a:t>
+            </a:r>
+            <a:r>
+              <a:rPr lang="zh-CN" altLang="en-US" dirty="0"/>
+              <a:t>代码，检查前向传播的输出是否正确？</a:t>
+            </a:r>
             <a:endParaRPr lang="en-US" altLang="zh-CN" dirty="0"/>
           </a:p>
           <a:p>
+            <a:endParaRPr lang="en-US" altLang="zh-CN" dirty="0"/>
+          </a:p>
+          <a:p>
             <a:pPr marL="285750" indent="-285750">
               <a:buFont typeface="Arial" panose="020B0604020202020204" pitchFamily="34" charset="0"/>
               <a:buChar char="•"/>
             </a:pPr>
             <a:r>
               <a:rPr lang="zh-CN" altLang="en-US" dirty="0"/>
-              <a:t>自学、互学、展学</a:t>
+              <a:t>自学、展学</a:t>
             </a:r>
           </a:p>
           <a:p>
@@ -16144,451 +18596,228 @@
           </a:p>
         </p:txBody>
       </p:sp>
+      <p:pic>
+        <p:nvPicPr>
+          <p:cNvPr id="2" name="图片 1">
+            <a:extLst>
+              <a:ext uri="{FF2B5EF4-FFF2-40B4-BE49-F238E27FC236}">
+                <a16:creationId xmlns:a16="http://schemas.microsoft.com/office/drawing/2014/main" id="{E17F5A5E-5F8D-FA26-EC54-C73BA8956524}"/>
+              </a:ext>
+            </a:extLst>
+          </p:cNvPr>
+          <p:cNvPicPr>
+            <a:picLocks noChangeAspect="1"/>
+          </p:cNvPicPr>
+          <p:nvPr/>
+        </p:nvPicPr>
+        <p:blipFill>
+          <a:blip r:embed="rId3">
+            <a:extLst>
+              <a:ext uri="{28A0092B-C50C-407E-A947-70E740481C1C}">
+                <a14:useLocalDpi xmlns:a14="http://schemas.microsoft.com/office/drawing/2010/main" val="0"/>
+              </a:ext>
+            </a:extLst>
+          </a:blip>
+          <a:stretch>
+            <a:fillRect/>
+          </a:stretch>
+        </p:blipFill>
+        <p:spPr>
+          <a:xfrm>
+            <a:off x="5966001" y="3866950"/>
+            <a:ext cx="5143500" cy="2349500"/>
+          </a:xfrm>
+          <a:prstGeom prst="rect">
+            <a:avLst/>
+          </a:prstGeom>
+        </p:spPr>
+      </p:pic>
     </p:spTree>
     <p:custDataLst>
       <p:tags r:id="rId1"/>
     </p:custDataLst>
     <p:extLst>
       <p:ext uri="{BB962C8B-B14F-4D97-AF65-F5344CB8AC3E}">
-        <p14:creationId xmlns:p14="http://schemas.microsoft.com/office/powerpoint/2010/main" val="1940258187"/>
+        <p14:creationId xmlns:p14="http://schemas.microsoft.com/office/powerpoint/2010/main" val="3751838865"/>
       </p:ext>
     </p:extLst>
   </p:cSld>
   <p:clrMapOvr>
     <a:masterClrMapping/>
   </p:clrMapOvr>
-</p:sld>
-</file>
-
-<file path=ppt/slides/slide28.xml><?xml version="1.0" encoding="utf-8"?>
-<p:sld xmlns:a="http://schemas.openxmlformats.org/drawingml/2006/main" xmlns:r="http://schemas.openxmlformats.org/officeDocument/2006/relationships" xmlns:p="http://schemas.openxmlformats.org/presentationml/2006/main">
-  <p:cSld>
-    <p:spTree>
-      <p:nvGrpSpPr>
-        <p:cNvPr id="1" name=""/>
-        <p:cNvGrpSpPr/>
-        <p:nvPr/>
-      </p:nvGrpSpPr>
-      <p:grpSpPr>
-        <a:xfrm>
-          <a:off x="0" y="0"/>
-          <a:ext cx="0" cy="0"/>
-          <a:chOff x="0" y="0"/>
-          <a:chExt cx="0" cy="0"/>
-        </a:xfrm>
-      </p:grpSpPr>
-      <p:sp>
-        <p:nvSpPr>
-          <p:cNvPr id="3" name="标题 2"/>
-          <p:cNvSpPr>
-            <a:spLocks noGrp="1"/>
-          </p:cNvSpPr>
-          <p:nvPr>
-            <p:ph type="title"/>
-          </p:nvPr>
-        </p:nvSpPr>
-        <p:spPr/>
-        <p:txBody>
-          <a:bodyPr/>
-          <a:lstStyle/>
-          <a:p>
-            <a:r>
-              <a:rPr lang="zh-CN" altLang="en-US" dirty="0"/>
-              <a:t>主问题：如何推导卷积层的前向传播？</a:t>
-            </a:r>
-            <a:endParaRPr dirty="0">
-              <a:sym typeface="+mn-ea"/>
-            </a:endParaRPr>
-          </a:p>
-        </p:txBody>
-      </p:sp>
-      <p:sp>
-        <p:nvSpPr>
-          <p:cNvPr id="6" name="文本占位符 1">
-            <a:extLst>
-              <a:ext uri="{FF2B5EF4-FFF2-40B4-BE49-F238E27FC236}">
-                <a16:creationId xmlns:a16="http://schemas.microsoft.com/office/drawing/2014/main" id="{BA88068A-4FDC-6963-46A5-ADEC46CDA15E}"/>
-              </a:ext>
-            </a:extLst>
-          </p:cNvPr>
-          <p:cNvSpPr txBox="1">
-            <a:spLocks/>
-          </p:cNvSpPr>
-          <p:nvPr/>
-        </p:nvSpPr>
-        <p:spPr>
-          <a:xfrm>
-            <a:off x="822325" y="1778635"/>
-            <a:ext cx="10852150" cy="4553585"/>
-          </a:xfrm>
-        </p:spPr>
-        <p:txBody>
-          <a:bodyPr lIns="101600" tIns="38100" rIns="76200" bIns="38100">
-            <a:noAutofit/>
-          </a:bodyPr>
-          <a:lstStyle>
-            <a:lvl1pPr marL="0" indent="0" algn="l" defTabSz="914400" rtl="0" eaLnBrk="1" fontAlgn="auto" latinLnBrk="0" hangingPunct="1">
-              <a:lnSpc>
-                <a:spcPct val="130000"/>
-              </a:lnSpc>
-              <a:spcBef>
-                <a:spcPts val="0"/>
-              </a:spcBef>
-              <a:spcAft>
-                <a:spcPts val="1000"/>
-              </a:spcAft>
-              <a:buFont typeface="Arial" panose="020B0604020202020204" pitchFamily="34" charset="0"/>
-              <a:buNone/>
-              <a:defRPr kumimoji="0" lang="zh-CN" altLang="en-US" sz="1600" b="0" i="0" u="none" strike="noStrike" kern="1200" cap="none" spc="150" normalizeH="0" baseline="0" noProof="1">
-                <a:solidFill>
-                  <a:schemeClr val="tx1"/>
-                </a:solidFill>
-                <a:uFillTx/>
-                <a:latin typeface="+mn-lt"/>
-                <a:ea typeface="+mn-ea"/>
-                <a:cs typeface="+mn-cs"/>
-                <a:sym typeface="+mn-ea"/>
-              </a:defRPr>
-            </a:lvl1pPr>
-            <a:lvl2pPr marL="457200" indent="0" algn="l" defTabSz="914400" rtl="0" eaLnBrk="1" fontAlgn="auto" latinLnBrk="0" hangingPunct="1">
-              <a:lnSpc>
-                <a:spcPct val="130000"/>
-              </a:lnSpc>
-              <a:spcBef>
-                <a:spcPts val="0"/>
-              </a:spcBef>
-              <a:spcAft>
-                <a:spcPts val="1000"/>
-              </a:spcAft>
-              <a:buFont typeface="Arial" panose="020B0604020202020204" pitchFamily="34" charset="0"/>
-              <a:buNone/>
-              <a:tabLst>
-                <a:tab pos="1609725" algn="l"/>
-              </a:tabLst>
-              <a:defRPr sz="2000" u="none" strike="noStrike" kern="1200" cap="none" spc="150" normalizeH="0" baseline="0">
-                <a:solidFill>
-                  <a:schemeClr val="tx1">
-                    <a:tint val="75000"/>
-                  </a:schemeClr>
-                </a:solidFill>
-                <a:uFillTx/>
-                <a:latin typeface="+mn-lt"/>
-                <a:ea typeface="+mn-ea"/>
-                <a:cs typeface="+mn-cs"/>
-              </a:defRPr>
-            </a:lvl2pPr>
-            <a:lvl3pPr marL="914400" indent="0" algn="l" defTabSz="914400" rtl="0" eaLnBrk="1" fontAlgn="auto" latinLnBrk="0" hangingPunct="1">
-              <a:lnSpc>
-                <a:spcPct val="130000"/>
-              </a:lnSpc>
-              <a:spcBef>
-                <a:spcPts val="0"/>
-              </a:spcBef>
-              <a:spcAft>
-                <a:spcPts val="1000"/>
-              </a:spcAft>
-              <a:buFont typeface="Arial" panose="020B0604020202020204" pitchFamily="34" charset="0"/>
-              <a:buNone/>
-              <a:defRPr sz="1800" u="none" strike="noStrike" kern="1200" cap="none" spc="150" normalizeH="0" baseline="0">
-                <a:solidFill>
-                  <a:schemeClr val="tx1">
-                    <a:tint val="75000"/>
-                  </a:schemeClr>
-                </a:solidFill>
-                <a:uFillTx/>
-                <a:latin typeface="+mn-lt"/>
-                <a:ea typeface="+mn-ea"/>
-                <a:cs typeface="+mn-cs"/>
-              </a:defRPr>
-            </a:lvl3pPr>
-            <a:lvl4pPr marL="1371600" indent="0" algn="l" defTabSz="914400" rtl="0" eaLnBrk="1" fontAlgn="auto" latinLnBrk="0" hangingPunct="1">
-              <a:lnSpc>
-                <a:spcPct val="130000"/>
-              </a:lnSpc>
-              <a:spcBef>
-                <a:spcPts val="0"/>
-              </a:spcBef>
-              <a:spcAft>
-                <a:spcPts val="1000"/>
-              </a:spcAft>
-              <a:buFont typeface="Arial" panose="020B0604020202020204" pitchFamily="34" charset="0"/>
-              <a:buNone/>
-              <a:defRPr sz="1600" u="none" strike="noStrike" kern="1200" cap="none" spc="150" normalizeH="0" baseline="0">
-                <a:solidFill>
-                  <a:schemeClr val="tx1">
-                    <a:tint val="75000"/>
-                  </a:schemeClr>
-                </a:solidFill>
-                <a:uFillTx/>
-                <a:latin typeface="+mn-lt"/>
-                <a:ea typeface="+mn-ea"/>
-                <a:cs typeface="+mn-cs"/>
-              </a:defRPr>
-            </a:lvl4pPr>
-            <a:lvl5pPr marL="1828800" indent="0" algn="l" defTabSz="914400" rtl="0" eaLnBrk="1" fontAlgn="auto" latinLnBrk="0" hangingPunct="1">
-              <a:lnSpc>
-                <a:spcPct val="130000"/>
-              </a:lnSpc>
-              <a:spcBef>
-                <a:spcPts val="0"/>
-              </a:spcBef>
-              <a:spcAft>
-                <a:spcPts val="1000"/>
-              </a:spcAft>
-              <a:buFont typeface="Arial" panose="020B0604020202020204" pitchFamily="34" charset="0"/>
-              <a:buNone/>
-              <a:defRPr sz="1600" u="none" strike="noStrike" kern="1200" cap="none" spc="150" normalizeH="0" baseline="0">
-                <a:solidFill>
-                  <a:schemeClr val="tx1">
-                    <a:tint val="75000"/>
-                  </a:schemeClr>
-                </a:solidFill>
-                <a:uFillTx/>
-                <a:latin typeface="+mn-lt"/>
-                <a:ea typeface="+mn-ea"/>
-                <a:cs typeface="+mn-cs"/>
-              </a:defRPr>
-            </a:lvl5pPr>
-            <a:lvl6pPr marL="2286000" indent="0" algn="l" defTabSz="914400" rtl="0" eaLnBrk="1" latinLnBrk="0" hangingPunct="1">
-              <a:lnSpc>
-                <a:spcPct val="90000"/>
-              </a:lnSpc>
-              <a:spcBef>
-                <a:spcPts val="500"/>
-              </a:spcBef>
-              <a:buFont typeface="Arial" panose="020B0604020202020204" pitchFamily="34" charset="0"/>
-              <a:buNone/>
-              <a:defRPr sz="1600" kern="1200">
-                <a:solidFill>
-                  <a:schemeClr val="tx1">
-                    <a:tint val="75000"/>
-                  </a:schemeClr>
-                </a:solidFill>
-                <a:latin typeface="+mn-lt"/>
-                <a:ea typeface="+mn-ea"/>
-                <a:cs typeface="+mn-cs"/>
-              </a:defRPr>
-            </a:lvl6pPr>
-            <a:lvl7pPr marL="2743200" indent="0" algn="l" defTabSz="914400" rtl="0" eaLnBrk="1" latinLnBrk="0" hangingPunct="1">
-              <a:lnSpc>
-                <a:spcPct val="90000"/>
-              </a:lnSpc>
-              <a:spcBef>
-                <a:spcPts val="500"/>
-              </a:spcBef>
-              <a:buFont typeface="Arial" panose="020B0604020202020204" pitchFamily="34" charset="0"/>
-              <a:buNone/>
-              <a:defRPr sz="1600" kern="1200">
-                <a:solidFill>
-                  <a:schemeClr val="tx1">
-                    <a:tint val="75000"/>
-                  </a:schemeClr>
-                </a:solidFill>
-                <a:latin typeface="+mn-lt"/>
-                <a:ea typeface="+mn-ea"/>
-                <a:cs typeface="+mn-cs"/>
-              </a:defRPr>
-            </a:lvl7pPr>
-            <a:lvl8pPr marL="3200400" indent="0" algn="l" defTabSz="914400" rtl="0" eaLnBrk="1" latinLnBrk="0" hangingPunct="1">
-              <a:lnSpc>
-                <a:spcPct val="90000"/>
-              </a:lnSpc>
-              <a:spcBef>
-                <a:spcPts val="500"/>
-              </a:spcBef>
-              <a:buFont typeface="Arial" panose="020B0604020202020204" pitchFamily="34" charset="0"/>
-              <a:buNone/>
-              <a:defRPr sz="1600" kern="1200">
-                <a:solidFill>
-                  <a:schemeClr val="tx1">
-                    <a:tint val="75000"/>
-                  </a:schemeClr>
-                </a:solidFill>
-                <a:latin typeface="+mn-lt"/>
-                <a:ea typeface="+mn-ea"/>
-                <a:cs typeface="+mn-cs"/>
-              </a:defRPr>
-            </a:lvl8pPr>
-            <a:lvl9pPr marL="3657600" indent="0" algn="l" defTabSz="914400" rtl="0" eaLnBrk="1" latinLnBrk="0" hangingPunct="1">
-              <a:lnSpc>
-                <a:spcPct val="90000"/>
-              </a:lnSpc>
-              <a:spcBef>
-                <a:spcPts val="500"/>
-              </a:spcBef>
-              <a:buFont typeface="Arial" panose="020B0604020202020204" pitchFamily="34" charset="0"/>
-              <a:buNone/>
-              <a:defRPr sz="1600" kern="1200">
-                <a:solidFill>
-                  <a:schemeClr val="tx1">
-                    <a:tint val="75000"/>
-                  </a:schemeClr>
-                </a:solidFill>
-                <a:latin typeface="+mn-lt"/>
-                <a:ea typeface="+mn-ea"/>
-                <a:cs typeface="+mn-cs"/>
-              </a:defRPr>
-            </a:lvl9pPr>
-          </a:lstStyle>
-          <a:p>
-            <a:pPr marL="285750" indent="-285750">
-              <a:buFont typeface="Arial" panose="020B0604020202020204" pitchFamily="34" charset="0"/>
-              <a:buChar char="•"/>
-            </a:pPr>
-            <a:endParaRPr lang="en-US" altLang="zh-CN" dirty="0"/>
-          </a:p>
-          <a:p>
-            <a:endParaRPr lang="en-US" altLang="zh-CN" dirty="0"/>
-          </a:p>
-          <a:p>
-            <a:pPr marL="285750" indent="-285750">
-              <a:buFont typeface="Arial" panose="020B0604020202020204" pitchFamily="34" charset="0"/>
-              <a:buChar char="•"/>
-            </a:pPr>
-            <a:r>
-              <a:rPr lang="zh-CN" altLang="en-US" dirty="0"/>
-              <a:t>自学、互学、展学</a:t>
-            </a:r>
-          </a:p>
-          <a:p>
-            <a:pPr marL="285750" indent="-285750">
-              <a:buFont typeface="Arial" panose="020B0604020202020204" pitchFamily="34" charset="0"/>
-              <a:buChar char="•"/>
-            </a:pPr>
-            <a:endParaRPr lang="zh-CN" altLang="en-US" dirty="0"/>
-          </a:p>
-          <a:p>
-            <a:pPr marL="285750" indent="-285750">
-              <a:buFont typeface="Arial" panose="020B0604020202020204" pitchFamily="34" charset="0"/>
-              <a:buChar char="•"/>
-            </a:pPr>
-            <a:endParaRPr lang="en-US" altLang="zh-CN" dirty="0"/>
-          </a:p>
-          <a:p>
-            <a:pPr marL="285750" indent="-285750">
-              <a:buFont typeface="Arial" panose="020B0604020202020204" pitchFamily="34" charset="0"/>
-              <a:buChar char="•"/>
-            </a:pPr>
-            <a:endParaRPr lang="zh-CN" altLang="en-US" dirty="0"/>
-          </a:p>
-          <a:p>
-            <a:pPr marL="285750" indent="-285750">
-              <a:buFont typeface="Arial" panose="020B0604020202020204" pitchFamily="34" charset="0"/>
-              <a:buChar char="•"/>
-            </a:pPr>
-            <a:endParaRPr lang="zh-CN" altLang="en-US" dirty="0"/>
-          </a:p>
-          <a:p>
-            <a:pPr marL="285750" indent="-285750">
-              <a:buFont typeface="Arial" panose="020B0604020202020204" pitchFamily="34" charset="0"/>
-              <a:buChar char="•"/>
-            </a:pPr>
-            <a:endParaRPr lang="zh-CN" altLang="en-US" dirty="0"/>
-          </a:p>
-          <a:p>
-            <a:pPr marL="285750" indent="-285750">
-              <a:buFont typeface="Arial" panose="020B0604020202020204" pitchFamily="34" charset="0"/>
-              <a:buChar char="•"/>
-            </a:pPr>
-            <a:endParaRPr lang="zh-CN" altLang="en-US" dirty="0"/>
-          </a:p>
-          <a:p>
-            <a:pPr marL="285750" indent="-285750">
-              <a:buFont typeface="Arial" panose="020B0604020202020204" pitchFamily="34" charset="0"/>
-              <a:buChar char="•"/>
-            </a:pPr>
-            <a:endParaRPr lang="zh-CN" altLang="en-US" dirty="0"/>
-          </a:p>
-          <a:p>
-            <a:pPr marL="285750" indent="-285750">
-              <a:buFont typeface="Arial" panose="020B0604020202020204" pitchFamily="34" charset="0"/>
-              <a:buChar char="•"/>
-            </a:pPr>
-            <a:endParaRPr lang="zh-CN" altLang="en-US" dirty="0"/>
-          </a:p>
-          <a:p>
-            <a:pPr marL="285750" indent="-285750">
-              <a:buFont typeface="Arial" panose="020B0604020202020204" pitchFamily="34" charset="0"/>
-              <a:buChar char="•"/>
-            </a:pPr>
-            <a:endParaRPr lang="zh-CN" altLang="en-US" dirty="0"/>
-          </a:p>
-        </p:txBody>
-      </p:sp>
-    </p:spTree>
-    <p:custDataLst>
-      <p:tags r:id="rId1"/>
-    </p:custDataLst>
-    <p:extLst>
-      <p:ext uri="{BB962C8B-B14F-4D97-AF65-F5344CB8AC3E}">
-        <p14:creationId xmlns:p14="http://schemas.microsoft.com/office/powerpoint/2010/main" val="640168469"/>
-      </p:ext>
-    </p:extLst>
-  </p:cSld>
-  <p:clrMapOvr>
-    <a:masterClrMapping/>
-  </p:clrMapOvr>
-</p:sld>
-</file>
-
-<file path=ppt/slides/slide29.xml><?xml version="1.0" encoding="utf-8"?>
-<p:sld xmlns:a="http://schemas.openxmlformats.org/drawingml/2006/main" xmlns:r="http://schemas.openxmlformats.org/officeDocument/2006/relationships" xmlns:p="http://schemas.openxmlformats.org/presentationml/2006/main">
-  <p:cSld>
-    <p:spTree>
-      <p:nvGrpSpPr>
-        <p:cNvPr id="1" name=""/>
-        <p:cNvGrpSpPr/>
-        <p:nvPr/>
-      </p:nvGrpSpPr>
-      <p:grpSpPr>
-        <a:xfrm>
-          <a:off x="0" y="0"/>
-          <a:ext cx="0" cy="0"/>
-          <a:chOff x="0" y="0"/>
-          <a:chExt cx="0" cy="0"/>
-        </a:xfrm>
-      </p:grpSpPr>
-      <p:sp>
-        <p:nvSpPr>
-          <p:cNvPr id="2" name="标题 1"/>
-          <p:cNvSpPr>
-            <a:spLocks noGrp="1"/>
-          </p:cNvSpPr>
-          <p:nvPr>
-            <p:ph type="title"/>
-          </p:nvPr>
-        </p:nvSpPr>
-        <p:spPr/>
-        <p:txBody>
-          <a:bodyPr/>
-          <a:lstStyle/>
-          <a:p>
-            <a:r>
-              <a:rPr lang="zh-CN" altLang="en-US" dirty="0">
-                <a:sym typeface="+mn-ea"/>
-              </a:rPr>
-              <a:t>任务：实现</a:t>
-            </a:r>
-            <a:r>
-              <a:rPr lang="zh-CN" altLang="en-US" dirty="0"/>
-              <a:t>卷积层的前向传播</a:t>
-            </a:r>
-          </a:p>
-        </p:txBody>
-      </p:sp>
-    </p:spTree>
-    <p:custDataLst>
-      <p:tags r:id="rId1"/>
-    </p:custDataLst>
-    <p:extLst>
-      <p:ext uri="{BB962C8B-B14F-4D97-AF65-F5344CB8AC3E}">
-        <p14:creationId xmlns:p14="http://schemas.microsoft.com/office/powerpoint/2010/main" val="973807582"/>
-      </p:ext>
-    </p:extLst>
-  </p:cSld>
-  <p:clrMapOvr>
-    <a:masterClrMapping/>
-  </p:clrMapOvr>
+  <p:timing>
+    <p:tnLst>
+      <p:par>
+        <p:cTn id="1" dur="indefinite" restart="never" nodeType="tmRoot">
+          <p:childTnLst>
+            <p:seq concurrent="1" nextAc="seek">
+              <p:cTn id="2" dur="indefinite" nodeType="mainSeq">
+                <p:childTnLst>
+                  <p:par>
+                    <p:cTn id="3" fill="hold">
+                      <p:stCondLst>
+                        <p:cond delay="indefinite"/>
+                      </p:stCondLst>
+                      <p:childTnLst>
+                        <p:par>
+                          <p:cTn id="4" fill="hold">
+                            <p:stCondLst>
+                              <p:cond delay="0"/>
+                            </p:stCondLst>
+                            <p:childTnLst>
+                              <p:par>
+                                <p:cTn id="5" presetID="1" presetClass="entr" presetSubtype="0" fill="hold" nodeType="clickEffect">
+                                  <p:stCondLst>
+                                    <p:cond delay="0"/>
+                                  </p:stCondLst>
+                                  <p:childTnLst>
+                                    <p:set>
+                                      <p:cBhvr>
+                                        <p:cTn id="6" dur="1" fill="hold">
+                                          <p:stCondLst>
+                                            <p:cond delay="0"/>
+                                          </p:stCondLst>
+                                        </p:cTn>
+                                        <p:tgtEl>
+                                          <p:spTgt spid="6">
+                                            <p:txEl>
+                                              <p:pRg st="0" end="0"/>
+                                            </p:txEl>
+                                          </p:spTgt>
+                                        </p:tgtEl>
+                                        <p:attrNameLst>
+                                          <p:attrName>style.visibility</p:attrName>
+                                        </p:attrNameLst>
+                                      </p:cBhvr>
+                                      <p:to>
+                                        <p:strVal val="visible"/>
+                                      </p:to>
+                                    </p:set>
+                                  </p:childTnLst>
+                                </p:cTn>
+                              </p:par>
+                            </p:childTnLst>
+                          </p:cTn>
+                        </p:par>
+                      </p:childTnLst>
+                    </p:cTn>
+                  </p:par>
+                  <p:par>
+                    <p:cTn id="7" fill="hold">
+                      <p:stCondLst>
+                        <p:cond delay="indefinite"/>
+                      </p:stCondLst>
+                      <p:childTnLst>
+                        <p:par>
+                          <p:cTn id="8" fill="hold">
+                            <p:stCondLst>
+                              <p:cond delay="0"/>
+                            </p:stCondLst>
+                            <p:childTnLst>
+                              <p:par>
+                                <p:cTn id="9" presetID="1" presetClass="entr" presetSubtype="0" fill="hold" nodeType="clickEffect">
+                                  <p:stCondLst>
+                                    <p:cond delay="0"/>
+                                  </p:stCondLst>
+                                  <p:childTnLst>
+                                    <p:set>
+                                      <p:cBhvr>
+                                        <p:cTn id="10" dur="1" fill="hold">
+                                          <p:stCondLst>
+                                            <p:cond delay="0"/>
+                                          </p:stCondLst>
+                                        </p:cTn>
+                                        <p:tgtEl>
+                                          <p:spTgt spid="2"/>
+                                        </p:tgtEl>
+                                        <p:attrNameLst>
+                                          <p:attrName>style.visibility</p:attrName>
+                                        </p:attrNameLst>
+                                      </p:cBhvr>
+                                      <p:to>
+                                        <p:strVal val="visible"/>
+                                      </p:to>
+                                    </p:set>
+                                  </p:childTnLst>
+                                </p:cTn>
+                              </p:par>
+                            </p:childTnLst>
+                          </p:cTn>
+                        </p:par>
+                      </p:childTnLst>
+                    </p:cTn>
+                  </p:par>
+                  <p:par>
+                    <p:cTn id="11" fill="hold">
+                      <p:stCondLst>
+                        <p:cond delay="indefinite"/>
+                      </p:stCondLst>
+                      <p:childTnLst>
+                        <p:par>
+                          <p:cTn id="12" fill="hold">
+                            <p:stCondLst>
+                              <p:cond delay="0"/>
+                            </p:stCondLst>
+                            <p:childTnLst>
+                              <p:par>
+                                <p:cTn id="13" presetID="1" presetClass="entr" presetSubtype="0" fill="hold" nodeType="clickEffect">
+                                  <p:stCondLst>
+                                    <p:cond delay="0"/>
+                                  </p:stCondLst>
+                                  <p:childTnLst>
+                                    <p:set>
+                                      <p:cBhvr>
+                                        <p:cTn id="14" dur="1" fill="hold">
+                                          <p:stCondLst>
+                                            <p:cond delay="0"/>
+                                          </p:stCondLst>
+                                        </p:cTn>
+                                        <p:tgtEl>
+                                          <p:spTgt spid="6">
+                                            <p:txEl>
+                                              <p:pRg st="1" end="1"/>
+                                            </p:txEl>
+                                          </p:spTgt>
+                                        </p:tgtEl>
+                                        <p:attrNameLst>
+                                          <p:attrName>style.visibility</p:attrName>
+                                        </p:attrNameLst>
+                                      </p:cBhvr>
+                                      <p:to>
+                                        <p:strVal val="visible"/>
+                                      </p:to>
+                                    </p:set>
+                                  </p:childTnLst>
+                                </p:cTn>
+                              </p:par>
+                            </p:childTnLst>
+                          </p:cTn>
+                        </p:par>
+                      </p:childTnLst>
+                    </p:cTn>
+                  </p:par>
+                </p:childTnLst>
+              </p:cTn>
+              <p:prevCondLst>
+                <p:cond evt="onPrev" delay="0">
+                  <p:tgtEl>
+                    <p:sldTgt/>
+                  </p:tgtEl>
+                </p:cond>
+              </p:prevCondLst>
+              <p:nextCondLst>
+                <p:cond evt="onNext" delay="0">
+                  <p:tgtEl>
+                    <p:sldTgt/>
+                  </p:tgtEl>
+                </p:cond>
+              </p:nextCondLst>
+            </p:seq>
+          </p:childTnLst>
+        </p:cTn>
+      </p:par>
+    </p:tnLst>
+  </p:timing>
 </p:sld>
 </file>
 
@@ -16702,6 +18931,17 @@
             <a:r>
               <a:rPr lang="zh-CN" altLang="en-US" dirty="0"/>
               <a:t>主问题：如何推导卷积层的前向传播？</a:t>
+            </a:r>
+            <a:endParaRPr lang="en-US" altLang="zh-CN" dirty="0"/>
+          </a:p>
+          <a:p>
+            <a:pPr marL="285750" indent="-285750">
+              <a:buFont typeface="Arial" panose="020B0604020202020204" pitchFamily="34" charset="0"/>
+              <a:buChar char="•"/>
+            </a:pPr>
+            <a:r>
+              <a:rPr lang="zh-CN" altLang="en-US" dirty="0"/>
+              <a:t>任务：实现卷积层的前向传播</a:t>
             </a:r>
             <a:br>
               <a:rPr lang="en-US" altLang="zh-CN" dirty="0"/>
@@ -17049,6 +19289,55 @@
                       </p:childTnLst>
                     </p:cTn>
                   </p:par>
+                  <p:par>
+                    <p:cTn id="27" fill="hold">
+                      <p:stCondLst>
+                        <p:cond delay="indefinite"/>
+                      </p:stCondLst>
+                      <p:childTnLst>
+                        <p:par>
+                          <p:cTn id="28" fill="hold">
+                            <p:stCondLst>
+                              <p:cond delay="0"/>
+                            </p:stCondLst>
+                            <p:childTnLst>
+                              <p:par>
+                                <p:cTn id="29" presetID="1" presetClass="entr" presetSubtype="0" fill="hold" grpId="0" nodeType="clickEffect">
+                                  <p:stCondLst>
+                                    <p:cond delay="0"/>
+                                  </p:stCondLst>
+                                  <p:childTnLst>
+                                    <p:set>
+                                      <p:cBhvr>
+                                        <p:cTn id="30" dur="1" fill="hold">
+                                          <p:stCondLst>
+                                            <p:cond delay="0"/>
+                                          </p:stCondLst>
+                                        </p:cTn>
+                                        <p:tgtEl>
+                                          <p:spTgt spid="2">
+                                            <p:txEl>
+                                              <p:pRg st="6" end="6"/>
+                                            </p:txEl>
+                                          </p:spTgt>
+                                        </p:tgtEl>
+                                        <p:attrNameLst>
+                                          <p:attrName>style.visibility</p:attrName>
+                                        </p:attrNameLst>
+                                      </p:cBhvr>
+                                      <p:to>
+                                        <p:strVal val="visible"/>
+                                      </p:to>
+                                    </p:set>
+                                  </p:childTnLst>
+                                </p:cTn>
+                              </p:par>
+                            </p:childTnLst>
+                          </p:cTn>
+                        </p:par>
+                      </p:childTnLst>
+                    </p:cTn>
+                  </p:par>
                 </p:childTnLst>
               </p:cTn>
               <p:prevCondLst>
@@ -17096,778 +19385,6 @@
       </p:grpSpPr>
       <p:sp>
         <p:nvSpPr>
-          <p:cNvPr id="3" name="标题 2"/>
-          <p:cNvSpPr>
-            <a:spLocks noGrp="1"/>
-          </p:cNvSpPr>
-          <p:nvPr>
-            <p:ph type="title"/>
-          </p:nvPr>
-        </p:nvSpPr>
-        <p:spPr/>
-        <p:txBody>
-          <a:bodyPr/>
-          <a:lstStyle/>
-          <a:p>
-            <a:r>
-              <a:rPr lang="zh-CN" altLang="en-US" dirty="0">
-                <a:sym typeface="+mn-ea"/>
-              </a:rPr>
-              <a:t>任务：实现</a:t>
-            </a:r>
-            <a:r>
-              <a:rPr lang="zh-CN" altLang="en-US" dirty="0"/>
-              <a:t>卷积层的前向传播</a:t>
-            </a:r>
-            <a:endParaRPr dirty="0">
-              <a:sym typeface="+mn-ea"/>
-            </a:endParaRPr>
-          </a:p>
-        </p:txBody>
-      </p:sp>
-      <p:sp>
-        <p:nvSpPr>
-          <p:cNvPr id="6" name="文本占位符 1">
-            <a:extLst>
-              <a:ext uri="{FF2B5EF4-FFF2-40B4-BE49-F238E27FC236}">
-                <a16:creationId xmlns:a16="http://schemas.microsoft.com/office/drawing/2014/main" id="{BA88068A-4FDC-6963-46A5-ADEC46CDA15E}"/>
-              </a:ext>
-            </a:extLst>
-          </p:cNvPr>
-          <p:cNvSpPr txBox="1">
-            <a:spLocks/>
-          </p:cNvSpPr>
-          <p:nvPr/>
-        </p:nvSpPr>
-        <p:spPr>
-          <a:xfrm>
-            <a:off x="822325" y="1778635"/>
-            <a:ext cx="10852150" cy="4553585"/>
-          </a:xfrm>
-        </p:spPr>
-        <p:txBody>
-          <a:bodyPr lIns="101600" tIns="38100" rIns="76200" bIns="38100">
-            <a:noAutofit/>
-          </a:bodyPr>
-          <a:lstStyle>
-            <a:lvl1pPr marL="0" indent="0" algn="l" defTabSz="914400" rtl="0" eaLnBrk="1" fontAlgn="auto" latinLnBrk="0" hangingPunct="1">
-              <a:lnSpc>
-                <a:spcPct val="130000"/>
-              </a:lnSpc>
-              <a:spcBef>
-                <a:spcPts val="0"/>
-              </a:spcBef>
-              <a:spcAft>
-                <a:spcPts val="1000"/>
-              </a:spcAft>
-              <a:buFont typeface="Arial" panose="020B0604020202020204" pitchFamily="34" charset="0"/>
-              <a:buNone/>
-              <a:defRPr kumimoji="0" lang="zh-CN" altLang="en-US" sz="1600" b="0" i="0" u="none" strike="noStrike" kern="1200" cap="none" spc="150" normalizeH="0" baseline="0" noProof="1">
-                <a:solidFill>
-                  <a:schemeClr val="tx1"/>
-                </a:solidFill>
-                <a:uFillTx/>
-                <a:latin typeface="+mn-lt"/>
-                <a:ea typeface="+mn-ea"/>
-                <a:cs typeface="+mn-cs"/>
-                <a:sym typeface="+mn-ea"/>
-              </a:defRPr>
-            </a:lvl1pPr>
-            <a:lvl2pPr marL="457200" indent="0" algn="l" defTabSz="914400" rtl="0" eaLnBrk="1" fontAlgn="auto" latinLnBrk="0" hangingPunct="1">
-              <a:lnSpc>
-                <a:spcPct val="130000"/>
-              </a:lnSpc>
-              <a:spcBef>
-                <a:spcPts val="0"/>
-              </a:spcBef>
-              <a:spcAft>
-                <a:spcPts val="1000"/>
-              </a:spcAft>
-              <a:buFont typeface="Arial" panose="020B0604020202020204" pitchFamily="34" charset="0"/>
-              <a:buNone/>
-              <a:tabLst>
-                <a:tab pos="1609725" algn="l"/>
-              </a:tabLst>
-              <a:defRPr sz="2000" u="none" strike="noStrike" kern="1200" cap="none" spc="150" normalizeH="0" baseline="0">
-                <a:solidFill>
-                  <a:schemeClr val="tx1">
-                    <a:tint val="75000"/>
-                  </a:schemeClr>
-                </a:solidFill>
-                <a:uFillTx/>
-                <a:latin typeface="+mn-lt"/>
-                <a:ea typeface="+mn-ea"/>
-                <a:cs typeface="+mn-cs"/>
-              </a:defRPr>
-            </a:lvl2pPr>
-            <a:lvl3pPr marL="914400" indent="0" algn="l" defTabSz="914400" rtl="0" eaLnBrk="1" fontAlgn="auto" latinLnBrk="0" hangingPunct="1">
-              <a:lnSpc>
-                <a:spcPct val="130000"/>
-              </a:lnSpc>
-              <a:spcBef>
-                <a:spcPts val="0"/>
-              </a:spcBef>
-              <a:spcAft>
-                <a:spcPts val="1000"/>
-              </a:spcAft>
-              <a:buFont typeface="Arial" panose="020B0604020202020204" pitchFamily="34" charset="0"/>
-              <a:buNone/>
-              <a:defRPr sz="1800" u="none" strike="noStrike" kern="1200" cap="none" spc="150" normalizeH="0" baseline="0">
-                <a:solidFill>
-                  <a:schemeClr val="tx1">
-                    <a:tint val="75000"/>
-                  </a:schemeClr>
-                </a:solidFill>
-                <a:uFillTx/>
-                <a:latin typeface="+mn-lt"/>
-                <a:ea typeface="+mn-ea"/>
-                <a:cs typeface="+mn-cs"/>
-              </a:defRPr>
-            </a:lvl3pPr>
-            <a:lvl4pPr marL="1371600" indent="0" algn="l" defTabSz="914400" rtl="0" eaLnBrk="1" fontAlgn="auto" latinLnBrk="0" hangingPunct="1">
-              <a:lnSpc>
-                <a:spcPct val="130000"/>
-              </a:lnSpc>
-              <a:spcBef>
-                <a:spcPts val="0"/>
-              </a:spcBef>
-              <a:spcAft>
-                <a:spcPts val="1000"/>
-              </a:spcAft>
-              <a:buFont typeface="Arial" panose="020B0604020202020204" pitchFamily="34" charset="0"/>
-              <a:buNone/>
-              <a:defRPr sz="1600" u="none" strike="noStrike" kern="1200" cap="none" spc="150" normalizeH="0" baseline="0">
-                <a:solidFill>
-                  <a:schemeClr val="tx1">
-                    <a:tint val="75000"/>
-                  </a:schemeClr>
-                </a:solidFill>
-                <a:uFillTx/>
-                <a:latin typeface="+mn-lt"/>
-                <a:ea typeface="+mn-ea"/>
-                <a:cs typeface="+mn-cs"/>
-              </a:defRPr>
-            </a:lvl4pPr>
-            <a:lvl5pPr marL="1828800" indent="0" algn="l" defTabSz="914400" rtl="0" eaLnBrk="1" fontAlgn="auto" latinLnBrk="0" hangingPunct="1">
-              <a:lnSpc>
-                <a:spcPct val="130000"/>
-              </a:lnSpc>
-              <a:spcBef>
-                <a:spcPts val="0"/>
-              </a:spcBef>
-              <a:spcAft>
-                <a:spcPts val="1000"/>
-              </a:spcAft>
-              <a:buFont typeface="Arial" panose="020B0604020202020204" pitchFamily="34" charset="0"/>
-              <a:buNone/>
-              <a:defRPr sz="1600" u="none" strike="noStrike" kern="1200" cap="none" spc="150" normalizeH="0" baseline="0">
-                <a:solidFill>
-                  <a:schemeClr val="tx1">
-                    <a:tint val="75000"/>
-                  </a:schemeClr>
-                </a:solidFill>
-                <a:uFillTx/>
-                <a:latin typeface="+mn-lt"/>
-                <a:ea typeface="+mn-ea"/>
-                <a:cs typeface="+mn-cs"/>
-              </a:defRPr>
-            </a:lvl5pPr>
-            <a:lvl6pPr marL="2286000" indent="0" algn="l" defTabSz="914400" rtl="0" eaLnBrk="1" latinLnBrk="0" hangingPunct="1">
-              <a:lnSpc>
-                <a:spcPct val="90000"/>
-              </a:lnSpc>
-              <a:spcBef>
-                <a:spcPts val="500"/>
-              </a:spcBef>
-              <a:buFont typeface="Arial" panose="020B0604020202020204" pitchFamily="34" charset="0"/>
-              <a:buNone/>
-              <a:defRPr sz="1600" kern="1200">
-                <a:solidFill>
-                  <a:schemeClr val="tx1">
-                    <a:tint val="75000"/>
-                  </a:schemeClr>
-                </a:solidFill>
-                <a:latin typeface="+mn-lt"/>
-                <a:ea typeface="+mn-ea"/>
-                <a:cs typeface="+mn-cs"/>
-              </a:defRPr>
-            </a:lvl6pPr>
-            <a:lvl7pPr marL="2743200" indent="0" algn="l" defTabSz="914400" rtl="0" eaLnBrk="1" latinLnBrk="0" hangingPunct="1">
-              <a:lnSpc>
-                <a:spcPct val="90000"/>
-              </a:lnSpc>
-              <a:spcBef>
-                <a:spcPts val="500"/>
-              </a:spcBef>
-              <a:buFont typeface="Arial" panose="020B0604020202020204" pitchFamily="34" charset="0"/>
-              <a:buNone/>
-              <a:defRPr sz="1600" kern="1200">
-                <a:solidFill>
-                  <a:schemeClr val="tx1">
-                    <a:tint val="75000"/>
-                  </a:schemeClr>
-                </a:solidFill>
-                <a:latin typeface="+mn-lt"/>
-                <a:ea typeface="+mn-ea"/>
-                <a:cs typeface="+mn-cs"/>
-              </a:defRPr>
-            </a:lvl7pPr>
-            <a:lvl8pPr marL="3200400" indent="0" algn="l" defTabSz="914400" rtl="0" eaLnBrk="1" latinLnBrk="0" hangingPunct="1">
-              <a:lnSpc>
-                <a:spcPct val="90000"/>
-              </a:lnSpc>
-              <a:spcBef>
-                <a:spcPts val="500"/>
-              </a:spcBef>
-              <a:buFont typeface="Arial" panose="020B0604020202020204" pitchFamily="34" charset="0"/>
-              <a:buNone/>
-              <a:defRPr sz="1600" kern="1200">
-                <a:solidFill>
-                  <a:schemeClr val="tx1">
-                    <a:tint val="75000"/>
-                  </a:schemeClr>
-                </a:solidFill>
-                <a:latin typeface="+mn-lt"/>
-                <a:ea typeface="+mn-ea"/>
-                <a:cs typeface="+mn-cs"/>
-              </a:defRPr>
-            </a:lvl8pPr>
-            <a:lvl9pPr marL="3657600" indent="0" algn="l" defTabSz="914400" rtl="0" eaLnBrk="1" latinLnBrk="0" hangingPunct="1">
-              <a:lnSpc>
-                <a:spcPct val="90000"/>
-              </a:lnSpc>
-              <a:spcBef>
-                <a:spcPts val="500"/>
-              </a:spcBef>
-              <a:buFont typeface="Arial" panose="020B0604020202020204" pitchFamily="34" charset="0"/>
-              <a:buNone/>
-              <a:defRPr sz="1600" kern="1200">
-                <a:solidFill>
-                  <a:schemeClr val="tx1">
-                    <a:tint val="75000"/>
-                  </a:schemeClr>
-                </a:solidFill>
-                <a:latin typeface="+mn-lt"/>
-                <a:ea typeface="+mn-ea"/>
-                <a:cs typeface="+mn-cs"/>
-              </a:defRPr>
-            </a:lvl9pPr>
-          </a:lstStyle>
-          <a:p>
-            <a:pPr marL="285750" indent="-285750">
-              <a:buFont typeface="Arial" panose="020B0604020202020204" pitchFamily="34" charset="0"/>
-              <a:buChar char="•"/>
-            </a:pPr>
-            <a:endParaRPr lang="en-US" altLang="zh-CN" dirty="0"/>
-          </a:p>
-          <a:p>
-            <a:pPr marL="285750" indent="-285750">
-              <a:buFont typeface="Arial" panose="020B0604020202020204" pitchFamily="34" charset="0"/>
-              <a:buChar char="•"/>
-            </a:pPr>
-            <a:endParaRPr lang="en-US" altLang="zh-CN" dirty="0"/>
-          </a:p>
-          <a:p>
-            <a:endParaRPr lang="en-US" altLang="zh-CN" dirty="0"/>
-          </a:p>
-          <a:p>
-            <a:pPr marL="285750" indent="-285750">
-              <a:buFont typeface="Arial" panose="020B0604020202020204" pitchFamily="34" charset="0"/>
-              <a:buChar char="•"/>
-            </a:pPr>
-            <a:r>
-              <a:rPr lang="zh-CN" altLang="en-US" dirty="0"/>
-              <a:t>自学、展学</a:t>
-            </a:r>
-          </a:p>
-          <a:p>
-            <a:pPr marL="285750" indent="-285750">
-              <a:buFont typeface="Arial" panose="020B0604020202020204" pitchFamily="34" charset="0"/>
-              <a:buChar char="•"/>
-            </a:pPr>
-            <a:endParaRPr lang="zh-CN" altLang="en-US" dirty="0"/>
-          </a:p>
-          <a:p>
-            <a:pPr marL="285750" indent="-285750">
-              <a:buFont typeface="Arial" panose="020B0604020202020204" pitchFamily="34" charset="0"/>
-              <a:buChar char="•"/>
-            </a:pPr>
-            <a:endParaRPr lang="en-US" altLang="zh-CN" dirty="0"/>
-          </a:p>
-          <a:p>
-            <a:pPr marL="285750" indent="-285750">
-              <a:buFont typeface="Arial" panose="020B0604020202020204" pitchFamily="34" charset="0"/>
-              <a:buChar char="•"/>
-            </a:pPr>
-            <a:endParaRPr lang="zh-CN" altLang="en-US" dirty="0"/>
-          </a:p>
-          <a:p>
-            <a:pPr marL="285750" indent="-285750">
-              <a:buFont typeface="Arial" panose="020B0604020202020204" pitchFamily="34" charset="0"/>
-              <a:buChar char="•"/>
-            </a:pPr>
-            <a:endParaRPr lang="zh-CN" altLang="en-US" dirty="0"/>
-          </a:p>
-          <a:p>
-            <a:pPr marL="285750" indent="-285750">
-              <a:buFont typeface="Arial" panose="020B0604020202020204" pitchFamily="34" charset="0"/>
-              <a:buChar char="•"/>
-            </a:pPr>
-            <a:endParaRPr lang="zh-CN" altLang="en-US" dirty="0"/>
-          </a:p>
-          <a:p>
-            <a:pPr marL="285750" indent="-285750">
-              <a:buFont typeface="Arial" panose="020B0604020202020204" pitchFamily="34" charset="0"/>
-              <a:buChar char="•"/>
-            </a:pPr>
-            <a:endParaRPr lang="zh-CN" altLang="en-US" dirty="0"/>
-          </a:p>
-          <a:p>
-            <a:pPr marL="285750" indent="-285750">
-              <a:buFont typeface="Arial" panose="020B0604020202020204" pitchFamily="34" charset="0"/>
-              <a:buChar char="•"/>
-            </a:pPr>
-            <a:endParaRPr lang="zh-CN" altLang="en-US" dirty="0"/>
-          </a:p>
-          <a:p>
-            <a:pPr marL="285750" indent="-285750">
-              <a:buFont typeface="Arial" panose="020B0604020202020204" pitchFamily="34" charset="0"/>
-              <a:buChar char="•"/>
-            </a:pPr>
-            <a:endParaRPr lang="zh-CN" altLang="en-US" dirty="0"/>
-          </a:p>
-          <a:p>
-            <a:pPr marL="285750" indent="-285750">
-              <a:buFont typeface="Arial" panose="020B0604020202020204" pitchFamily="34" charset="0"/>
-              <a:buChar char="•"/>
-            </a:pPr>
-            <a:endParaRPr lang="zh-CN" altLang="en-US" dirty="0"/>
-          </a:p>
-        </p:txBody>
-      </p:sp>
-    </p:spTree>
-    <p:custDataLst>
-      <p:tags r:id="rId1"/>
-    </p:custDataLst>
-    <p:extLst>
-      <p:ext uri="{BB962C8B-B14F-4D97-AF65-F5344CB8AC3E}">
-        <p14:creationId xmlns:p14="http://schemas.microsoft.com/office/powerpoint/2010/main" val="3751838865"/>
-      </p:ext>
-    </p:extLst>
-  </p:cSld>
-  <p:clrMapOvr>
-    <a:masterClrMapping/>
-  </p:clrMapOvr>
-</p:sld>
-</file>
-
-<file path=ppt/slides/slide31.xml><?xml version="1.0" encoding="utf-8"?>
-<p:sld xmlns:a="http://schemas.openxmlformats.org/drawingml/2006/main" xmlns:r="http://schemas.openxmlformats.org/officeDocument/2006/relationships" xmlns:p="http://schemas.openxmlformats.org/presentationml/2006/main">
-  <p:cSld>
-    <p:spTree>
-      <p:nvGrpSpPr>
-        <p:cNvPr id="1" name=""/>
-        <p:cNvGrpSpPr/>
-        <p:nvPr/>
-      </p:nvGrpSpPr>
-      <p:grpSpPr>
-        <a:xfrm>
-          <a:off x="0" y="0"/>
-          <a:ext cx="0" cy="0"/>
-          <a:chOff x="0" y="0"/>
-          <a:chExt cx="0" cy="0"/>
-        </a:xfrm>
-      </p:grpSpPr>
-      <p:sp>
-        <p:nvSpPr>
-          <p:cNvPr id="3" name="标题 2"/>
-          <p:cNvSpPr>
-            <a:spLocks noGrp="1"/>
-          </p:cNvSpPr>
-          <p:nvPr>
-            <p:ph type="title"/>
-          </p:nvPr>
-        </p:nvSpPr>
-        <p:spPr/>
-        <p:txBody>
-          <a:bodyPr/>
-          <a:lstStyle/>
-          <a:p>
-            <a:r>
-              <a:rPr lang="zh-CN" altLang="en-US" dirty="0">
-                <a:sym typeface="+mn-ea"/>
-              </a:rPr>
-              <a:t>任务：实现</a:t>
-            </a:r>
-            <a:r>
-              <a:rPr lang="zh-CN" altLang="en-US" dirty="0"/>
-              <a:t>卷积层的前向传播</a:t>
-            </a:r>
-            <a:endParaRPr dirty="0">
-              <a:sym typeface="+mn-ea"/>
-            </a:endParaRPr>
-          </a:p>
-        </p:txBody>
-      </p:sp>
-      <p:sp>
-        <p:nvSpPr>
-          <p:cNvPr id="6" name="文本占位符 1">
-            <a:extLst>
-              <a:ext uri="{FF2B5EF4-FFF2-40B4-BE49-F238E27FC236}">
-                <a16:creationId xmlns:a16="http://schemas.microsoft.com/office/drawing/2014/main" id="{BA88068A-4FDC-6963-46A5-ADEC46CDA15E}"/>
-              </a:ext>
-            </a:extLst>
-          </p:cNvPr>
-          <p:cNvSpPr txBox="1">
-            <a:spLocks/>
-          </p:cNvSpPr>
-          <p:nvPr/>
-        </p:nvSpPr>
-        <p:spPr>
-          <a:xfrm>
-            <a:off x="822325" y="1778635"/>
-            <a:ext cx="10852150" cy="4553585"/>
-          </a:xfrm>
-        </p:spPr>
-        <p:txBody>
-          <a:bodyPr lIns="101600" tIns="38100" rIns="76200" bIns="38100">
-            <a:noAutofit/>
-          </a:bodyPr>
-          <a:lstStyle>
-            <a:lvl1pPr marL="0" indent="0" algn="l" defTabSz="914400" rtl="0" eaLnBrk="1" fontAlgn="auto" latinLnBrk="0" hangingPunct="1">
-              <a:lnSpc>
-                <a:spcPct val="130000"/>
-              </a:lnSpc>
-              <a:spcBef>
-                <a:spcPts val="0"/>
-              </a:spcBef>
-              <a:spcAft>
-                <a:spcPts val="1000"/>
-              </a:spcAft>
-              <a:buFont typeface="Arial" panose="020B0604020202020204" pitchFamily="34" charset="0"/>
-              <a:buNone/>
-              <a:defRPr kumimoji="0" lang="zh-CN" altLang="en-US" sz="1600" b="0" i="0" u="none" strike="noStrike" kern="1200" cap="none" spc="150" normalizeH="0" baseline="0" noProof="1">
-                <a:solidFill>
-                  <a:schemeClr val="tx1"/>
-                </a:solidFill>
-                <a:uFillTx/>
-                <a:latin typeface="+mn-lt"/>
-                <a:ea typeface="+mn-ea"/>
-                <a:cs typeface="+mn-cs"/>
-                <a:sym typeface="+mn-ea"/>
-              </a:defRPr>
-            </a:lvl1pPr>
-            <a:lvl2pPr marL="457200" indent="0" algn="l" defTabSz="914400" rtl="0" eaLnBrk="1" fontAlgn="auto" latinLnBrk="0" hangingPunct="1">
-              <a:lnSpc>
-                <a:spcPct val="130000"/>
-              </a:lnSpc>
-              <a:spcBef>
-                <a:spcPts val="0"/>
-              </a:spcBef>
-              <a:spcAft>
-                <a:spcPts val="1000"/>
-              </a:spcAft>
-              <a:buFont typeface="Arial" panose="020B0604020202020204" pitchFamily="34" charset="0"/>
-              <a:buNone/>
-              <a:tabLst>
-                <a:tab pos="1609725" algn="l"/>
-              </a:tabLst>
-              <a:defRPr sz="2000" u="none" strike="noStrike" kern="1200" cap="none" spc="150" normalizeH="0" baseline="0">
-                <a:solidFill>
-                  <a:schemeClr val="tx1">
-                    <a:tint val="75000"/>
-                  </a:schemeClr>
-                </a:solidFill>
-                <a:uFillTx/>
-                <a:latin typeface="+mn-lt"/>
-                <a:ea typeface="+mn-ea"/>
-                <a:cs typeface="+mn-cs"/>
-              </a:defRPr>
-            </a:lvl2pPr>
-            <a:lvl3pPr marL="914400" indent="0" algn="l" defTabSz="914400" rtl="0" eaLnBrk="1" fontAlgn="auto" latinLnBrk="0" hangingPunct="1">
-              <a:lnSpc>
-                <a:spcPct val="130000"/>
-              </a:lnSpc>
-              <a:spcBef>
-                <a:spcPts val="0"/>
-              </a:spcBef>
-              <a:spcAft>
-                <a:spcPts val="1000"/>
-              </a:spcAft>
-              <a:buFont typeface="Arial" panose="020B0604020202020204" pitchFamily="34" charset="0"/>
-              <a:buNone/>
-              <a:defRPr sz="1800" u="none" strike="noStrike" kern="1200" cap="none" spc="150" normalizeH="0" baseline="0">
-                <a:solidFill>
-                  <a:schemeClr val="tx1">
-                    <a:tint val="75000"/>
-                  </a:schemeClr>
-                </a:solidFill>
-                <a:uFillTx/>
-                <a:latin typeface="+mn-lt"/>
-                <a:ea typeface="+mn-ea"/>
-                <a:cs typeface="+mn-cs"/>
-              </a:defRPr>
-            </a:lvl3pPr>
-            <a:lvl4pPr marL="1371600" indent="0" algn="l" defTabSz="914400" rtl="0" eaLnBrk="1" fontAlgn="auto" latinLnBrk="0" hangingPunct="1">
-              <a:lnSpc>
-                <a:spcPct val="130000"/>
-              </a:lnSpc>
-              <a:spcBef>
-                <a:spcPts val="0"/>
-              </a:spcBef>
-              <a:spcAft>
-                <a:spcPts val="1000"/>
-              </a:spcAft>
-              <a:buFont typeface="Arial" panose="020B0604020202020204" pitchFamily="34" charset="0"/>
-              <a:buNone/>
-              <a:defRPr sz="1600" u="none" strike="noStrike" kern="1200" cap="none" spc="150" normalizeH="0" baseline="0">
-                <a:solidFill>
-                  <a:schemeClr val="tx1">
-                    <a:tint val="75000"/>
-                  </a:schemeClr>
-                </a:solidFill>
-                <a:uFillTx/>
-                <a:latin typeface="+mn-lt"/>
-                <a:ea typeface="+mn-ea"/>
-                <a:cs typeface="+mn-cs"/>
-              </a:defRPr>
-            </a:lvl4pPr>
-            <a:lvl5pPr marL="1828800" indent="0" algn="l" defTabSz="914400" rtl="0" eaLnBrk="1" fontAlgn="auto" latinLnBrk="0" hangingPunct="1">
-              <a:lnSpc>
-                <a:spcPct val="130000"/>
-              </a:lnSpc>
-              <a:spcBef>
-                <a:spcPts val="0"/>
-              </a:spcBef>
-              <a:spcAft>
-                <a:spcPts val="1000"/>
-              </a:spcAft>
-              <a:buFont typeface="Arial" panose="020B0604020202020204" pitchFamily="34" charset="0"/>
-              <a:buNone/>
-              <a:defRPr sz="1600" u="none" strike="noStrike" kern="1200" cap="none" spc="150" normalizeH="0" baseline="0">
-                <a:solidFill>
-                  <a:schemeClr val="tx1">
-                    <a:tint val="75000"/>
-                  </a:schemeClr>
-                </a:solidFill>
-                <a:uFillTx/>
-                <a:latin typeface="+mn-lt"/>
-                <a:ea typeface="+mn-ea"/>
-                <a:cs typeface="+mn-cs"/>
-              </a:defRPr>
-            </a:lvl5pPr>
-            <a:lvl6pPr marL="2286000" indent="0" algn="l" defTabSz="914400" rtl="0" eaLnBrk="1" latinLnBrk="0" hangingPunct="1">
-              <a:lnSpc>
-                <a:spcPct val="90000"/>
-              </a:lnSpc>
-              <a:spcBef>
-                <a:spcPts val="500"/>
-              </a:spcBef>
-              <a:buFont typeface="Arial" panose="020B0604020202020204" pitchFamily="34" charset="0"/>
-              <a:buNone/>
-              <a:defRPr sz="1600" kern="1200">
-                <a:solidFill>
-                  <a:schemeClr val="tx1">
-                    <a:tint val="75000"/>
-                  </a:schemeClr>
-                </a:solidFill>
-                <a:latin typeface="+mn-lt"/>
-                <a:ea typeface="+mn-ea"/>
-                <a:cs typeface="+mn-cs"/>
-              </a:defRPr>
-            </a:lvl6pPr>
-            <a:lvl7pPr marL="2743200" indent="0" algn="l" defTabSz="914400" rtl="0" eaLnBrk="1" latinLnBrk="0" hangingPunct="1">
-              <a:lnSpc>
-                <a:spcPct val="90000"/>
-              </a:lnSpc>
-              <a:spcBef>
-                <a:spcPts val="500"/>
-              </a:spcBef>
-              <a:buFont typeface="Arial" panose="020B0604020202020204" pitchFamily="34" charset="0"/>
-              <a:buNone/>
-              <a:defRPr sz="1600" kern="1200">
-                <a:solidFill>
-                  <a:schemeClr val="tx1">
-                    <a:tint val="75000"/>
-                  </a:schemeClr>
-                </a:solidFill>
-                <a:latin typeface="+mn-lt"/>
-                <a:ea typeface="+mn-ea"/>
-                <a:cs typeface="+mn-cs"/>
-              </a:defRPr>
-            </a:lvl7pPr>
-            <a:lvl8pPr marL="3200400" indent="0" algn="l" defTabSz="914400" rtl="0" eaLnBrk="1" latinLnBrk="0" hangingPunct="1">
-              <a:lnSpc>
-                <a:spcPct val="90000"/>
-              </a:lnSpc>
-              <a:spcBef>
-                <a:spcPts val="500"/>
-              </a:spcBef>
-              <a:buFont typeface="Arial" panose="020B0604020202020204" pitchFamily="34" charset="0"/>
-              <a:buNone/>
-              <a:defRPr sz="1600" kern="1200">
-                <a:solidFill>
-                  <a:schemeClr val="tx1">
-                    <a:tint val="75000"/>
-                  </a:schemeClr>
-                </a:solidFill>
-                <a:latin typeface="+mn-lt"/>
-                <a:ea typeface="+mn-ea"/>
-                <a:cs typeface="+mn-cs"/>
-              </a:defRPr>
-            </a:lvl8pPr>
-            <a:lvl9pPr marL="3657600" indent="0" algn="l" defTabSz="914400" rtl="0" eaLnBrk="1" latinLnBrk="0" hangingPunct="1">
-              <a:lnSpc>
-                <a:spcPct val="90000"/>
-              </a:lnSpc>
-              <a:spcBef>
-                <a:spcPts val="500"/>
-              </a:spcBef>
-              <a:buFont typeface="Arial" panose="020B0604020202020204" pitchFamily="34" charset="0"/>
-              <a:buNone/>
-              <a:defRPr sz="1600" kern="1200">
-                <a:solidFill>
-                  <a:schemeClr val="tx1">
-                    <a:tint val="75000"/>
-                  </a:schemeClr>
-                </a:solidFill>
-                <a:latin typeface="+mn-lt"/>
-                <a:ea typeface="+mn-ea"/>
-                <a:cs typeface="+mn-cs"/>
-              </a:defRPr>
-            </a:lvl9pPr>
-          </a:lstStyle>
-          <a:p>
-            <a:pPr marL="285750" indent="-285750">
-              <a:buFont typeface="Arial" panose="020B0604020202020204" pitchFamily="34" charset="0"/>
-              <a:buChar char="•"/>
-            </a:pPr>
-            <a:r>
-              <a:rPr lang="zh-CN" altLang="en-US" dirty="0"/>
-              <a:t>验证</a:t>
-            </a:r>
-            <a:endParaRPr lang="en-US" altLang="zh-CN" dirty="0"/>
-          </a:p>
-          <a:p>
-            <a:pPr marL="285750" indent="-285750">
-              <a:buFont typeface="Arial" panose="020B0604020202020204" pitchFamily="34" charset="0"/>
-              <a:buChar char="•"/>
-            </a:pPr>
-            <a:endParaRPr lang="en-US" altLang="zh-CN" dirty="0"/>
-          </a:p>
-          <a:p>
-            <a:endParaRPr lang="en-US" altLang="zh-CN" dirty="0"/>
-          </a:p>
-          <a:p>
-            <a:pPr marL="285750" indent="-285750">
-              <a:buFont typeface="Arial" panose="020B0604020202020204" pitchFamily="34" charset="0"/>
-              <a:buChar char="•"/>
-            </a:pPr>
-            <a:r>
-              <a:rPr lang="zh-CN" altLang="en-US" dirty="0"/>
-              <a:t>自学、展学</a:t>
-            </a:r>
-          </a:p>
-          <a:p>
-            <a:pPr marL="285750" indent="-285750">
-              <a:buFont typeface="Arial" panose="020B0604020202020204" pitchFamily="34" charset="0"/>
-              <a:buChar char="•"/>
-            </a:pPr>
-            <a:endParaRPr lang="zh-CN" altLang="en-US" dirty="0"/>
-          </a:p>
-          <a:p>
-            <a:pPr marL="285750" indent="-285750">
-              <a:buFont typeface="Arial" panose="020B0604020202020204" pitchFamily="34" charset="0"/>
-              <a:buChar char="•"/>
-            </a:pPr>
-            <a:endParaRPr lang="en-US" altLang="zh-CN" dirty="0"/>
-          </a:p>
-          <a:p>
-            <a:pPr marL="285750" indent="-285750">
-              <a:buFont typeface="Arial" panose="020B0604020202020204" pitchFamily="34" charset="0"/>
-              <a:buChar char="•"/>
-            </a:pPr>
-            <a:endParaRPr lang="zh-CN" altLang="en-US" dirty="0"/>
-          </a:p>
-          <a:p>
-            <a:pPr marL="285750" indent="-285750">
-              <a:buFont typeface="Arial" panose="020B0604020202020204" pitchFamily="34" charset="0"/>
-              <a:buChar char="•"/>
-            </a:pPr>
-            <a:endParaRPr lang="zh-CN" altLang="en-US" dirty="0"/>
-          </a:p>
-          <a:p>
-            <a:pPr marL="285750" indent="-285750">
-              <a:buFont typeface="Arial" panose="020B0604020202020204" pitchFamily="34" charset="0"/>
-              <a:buChar char="•"/>
-            </a:pPr>
-            <a:endParaRPr lang="zh-CN" altLang="en-US" dirty="0"/>
-          </a:p>
-          <a:p>
-            <a:pPr marL="285750" indent="-285750">
-              <a:buFont typeface="Arial" panose="020B0604020202020204" pitchFamily="34" charset="0"/>
-              <a:buChar char="•"/>
-            </a:pPr>
-            <a:endParaRPr lang="zh-CN" altLang="en-US" dirty="0"/>
-          </a:p>
-          <a:p>
-            <a:pPr marL="285750" indent="-285750">
-              <a:buFont typeface="Arial" panose="020B0604020202020204" pitchFamily="34" charset="0"/>
-              <a:buChar char="•"/>
-            </a:pPr>
-            <a:endParaRPr lang="zh-CN" altLang="en-US" dirty="0"/>
-          </a:p>
-          <a:p>
-            <a:pPr marL="285750" indent="-285750">
-              <a:buFont typeface="Arial" panose="020B0604020202020204" pitchFamily="34" charset="0"/>
-              <a:buChar char="•"/>
-            </a:pPr>
-            <a:endParaRPr lang="zh-CN" altLang="en-US" dirty="0"/>
-          </a:p>
-          <a:p>
-            <a:pPr marL="285750" indent="-285750">
-              <a:buFont typeface="Arial" panose="020B0604020202020204" pitchFamily="34" charset="0"/>
-              <a:buChar char="•"/>
-            </a:pPr>
-            <a:endParaRPr lang="zh-CN" altLang="en-US" dirty="0"/>
-          </a:p>
-        </p:txBody>
-      </p:sp>
-    </p:spTree>
-    <p:custDataLst>
-      <p:tags r:id="rId1"/>
-    </p:custDataLst>
-    <p:extLst>
-      <p:ext uri="{BB962C8B-B14F-4D97-AF65-F5344CB8AC3E}">
-        <p14:creationId xmlns:p14="http://schemas.microsoft.com/office/powerpoint/2010/main" val="36509934"/>
-      </p:ext>
-    </p:extLst>
-  </p:cSld>
-  <p:clrMapOvr>
-    <a:masterClrMapping/>
-  </p:clrMapOvr>
-</p:sld>
-</file>
-
-<file path=ppt/slides/slide32.xml><?xml version="1.0" encoding="utf-8"?>
-<p:sld xmlns:a="http://schemas.openxmlformats.org/drawingml/2006/main" xmlns:r="http://schemas.openxmlformats.org/officeDocument/2006/relationships" xmlns:p="http://schemas.openxmlformats.org/presentationml/2006/main">
-  <p:cSld>
-    <p:spTree>
-      <p:nvGrpSpPr>
-        <p:cNvPr id="1" name=""/>
-        <p:cNvGrpSpPr/>
-        <p:nvPr/>
-      </p:nvGrpSpPr>
-      <p:grpSpPr>
-        <a:xfrm>
-          <a:off x="0" y="0"/>
-          <a:ext cx="0" cy="0"/>
-          <a:chOff x="0" y="0"/>
-          <a:chExt cx="0" cy="0"/>
-        </a:xfrm>
-      </p:grpSpPr>
-      <p:sp>
-        <p:nvSpPr>
           <p:cNvPr id="2" name="标题 1"/>
           <p:cNvSpPr>
             <a:spLocks noGrp="1"/>
@@ -17899,7 +19416,7 @@
 </p:sld>
 </file>
 
-<file path=ppt/slides/slide33.xml><?xml version="1.0" encoding="utf-8"?>
+<file path=ppt/slides/slide31.xml><?xml version="1.0" encoding="utf-8"?>
 <p:sld xmlns:a="http://schemas.openxmlformats.org/drawingml/2006/main" xmlns:r="http://schemas.openxmlformats.org/officeDocument/2006/relationships" xmlns:p="http://schemas.openxmlformats.org/presentationml/2006/main">
   <p:cSld>
     <p:spTree>
@@ -17952,7 +19469,7 @@
             </a:pPr>
             <a:r>
               <a:rPr lang="en-US" dirty="0" err="1"/>
-              <a:t>请回答所有主问题</a:t>
+              <a:t>请回答开始的问题</a:t>
             </a:r>
             <a:r>
               <a:rPr lang="zh-CN" altLang="en-US" dirty="0"/>
@@ -18209,7 +19726,7 @@
 </p:sld>
 </file>
 
-<file path=ppt/slides/slide34.xml><?xml version="1.0" encoding="utf-8"?>
+<file path=ppt/slides/slide32.xml><?xml version="1.0" encoding="utf-8"?>
 <p:sld xmlns:a="http://schemas.openxmlformats.org/drawingml/2006/main" xmlns:r="http://schemas.openxmlformats.org/officeDocument/2006/relationships" xmlns:p="http://schemas.openxmlformats.org/presentationml/2006/main">
   <p:cSld>
     <p:spTree>
@@ -18394,6 +19911,120 @@
 </p:sld>
 </file>
 
+<file path=ppt/slides/slide33.xml><?xml version="1.0" encoding="utf-8"?>
+<p:sld xmlns:a="http://schemas.openxmlformats.org/drawingml/2006/main" xmlns:r="http://schemas.openxmlformats.org/officeDocument/2006/relationships" xmlns:p="http://schemas.openxmlformats.org/presentationml/2006/main">
+  <p:cSld>
+    <p:spTree>
+      <p:nvGrpSpPr>
+        <p:cNvPr id="1" name=""/>
+        <p:cNvGrpSpPr/>
+        <p:nvPr/>
+      </p:nvGrpSpPr>
+      <p:grpSpPr>
+        <a:xfrm>
+          <a:off x="0" y="0"/>
+          <a:ext cx="0" cy="0"/>
+          <a:chOff x="0" y="0"/>
+          <a:chExt cx="0" cy="0"/>
+        </a:xfrm>
+      </p:grpSpPr>
+      <p:sp>
+        <p:nvSpPr>
+          <p:cNvPr id="2" name="文本占位符 1"/>
+          <p:cNvSpPr>
+            <a:spLocks noGrp="1"/>
+          </p:cNvSpPr>
+          <p:nvPr>
+            <p:ph type="body" idx="1"/>
+          </p:nvPr>
+        </p:nvSpPr>
+        <p:spPr/>
+        <p:txBody>
+          <a:bodyPr/>
+          <a:lstStyle/>
+          <a:p>
+            <a:pPr marL="285750" indent="-285750">
+              <a:buFont typeface="Arial" panose="020B0604020202020204" pitchFamily="34" charset="0"/>
+              <a:buChar char="•"/>
+            </a:pPr>
+            <a:r>
+              <a:rPr lang="zh-CN" altLang="en-US" dirty="0">
+                <a:sym typeface="+mn-ea"/>
+              </a:rPr>
+              <a:t>最大池化层的前向传播推导</a:t>
+            </a:r>
+            <a:endParaRPr dirty="0">
+              <a:sym typeface="+mn-ea"/>
+            </a:endParaRPr>
+          </a:p>
+        </p:txBody>
+      </p:sp>
+      <p:sp>
+        <p:nvSpPr>
+          <p:cNvPr id="3" name="标题 2"/>
+          <p:cNvSpPr>
+            <a:spLocks noGrp="1"/>
+          </p:cNvSpPr>
+          <p:nvPr>
+            <p:ph type="title"/>
+          </p:nvPr>
+        </p:nvSpPr>
+        <p:spPr/>
+        <p:txBody>
+          <a:bodyPr/>
+          <a:lstStyle/>
+          <a:p>
+            <a:r>
+              <a:rPr lang="zh-CN" altLang="en-US"/>
+              <a:t>下节课预告</a:t>
+            </a:r>
+          </a:p>
+        </p:txBody>
+      </p:sp>
+    </p:spTree>
+    <p:custDataLst>
+      <p:tags r:id="rId1"/>
+    </p:custDataLst>
+    <p:extLst>
+      <p:ext uri="{BB962C8B-B14F-4D97-AF65-F5344CB8AC3E}">
+        <p14:creationId xmlns:p14="http://schemas.microsoft.com/office/powerpoint/2010/main" val="1027050507"/>
+      </p:ext>
+    </p:extLst>
+  </p:cSld>
+  <p:clrMapOvr>
+    <a:masterClrMapping/>
+  </p:clrMapOvr>
+</p:sld>
+</file>
+
+<file path=ppt/slides/slide34.xml><?xml version="1.0" encoding="utf-8"?>
+<p:sld xmlns:a="http://schemas.openxmlformats.org/drawingml/2006/main" xmlns:r="http://schemas.openxmlformats.org/officeDocument/2006/relationships" xmlns:p="http://schemas.openxmlformats.org/presentationml/2006/main">
+  <p:cSld>
+    <p:spTree>
+      <p:nvGrpSpPr>
+        <p:cNvPr id="1" name=""/>
+        <p:cNvGrpSpPr/>
+        <p:nvPr/>
+      </p:nvGrpSpPr>
+      <p:grpSpPr>
+        <a:xfrm>
+          <a:off x="0" y="0"/>
+          <a:ext cx="0" cy="0"/>
+          <a:chOff x="0" y="0"/>
+          <a:chExt cx="0" cy="0"/>
+        </a:xfrm>
+      </p:grpSpPr>
+    </p:spTree>
+    <p:custDataLst>
+      <p:tags r:id="rId1"/>
+    </p:custDataLst>
+  </p:cSld>
+  <p:clrMapOvr>
+    <a:masterClrMapping/>
+  </p:clrMapOvr>
+</p:sld>
+</file>
+
 <file path=ppt/slides/slide35.xml><?xml version="1.0" encoding="utf-8"?>
 <p:sld xmlns:a="http://schemas.openxmlformats.org/drawingml/2006/main" xmlns:r="http://schemas.openxmlformats.org/officeDocument/2006/relationships" xmlns:p="http://schemas.openxmlformats.org/presentationml/2006/main">
   <p:cSld>
@@ -18430,15 +20061,7 @@
               <a:buFont typeface="Arial" panose="020B0604020202020204" pitchFamily="34" charset="0"/>
               <a:buChar char="•"/>
             </a:pPr>
-            <a:r>
-              <a:rPr lang="zh-CN" altLang="en-US" dirty="0">
-                <a:sym typeface="+mn-ea"/>
-              </a:rPr>
-              <a:t>最大池化层的前向传播推导</a:t>
-            </a:r>
-            <a:endParaRPr dirty="0">
-              <a:sym typeface="+mn-ea"/>
-            </a:endParaRPr>
+            <a:endParaRPr lang="en-US" altLang="zh-CN" dirty="0"/>
           </a:p>
         </p:txBody>
       </p:sp>
@@ -18458,112 +20081,6 @@
           <a:lstStyle/>
           <a:p>
             <a:r>
-              <a:rPr lang="zh-CN" altLang="en-US"/>
-              <a:t>下节课预告</a:t>
-            </a:r>
-          </a:p>
-        </p:txBody>
-      </p:sp>
-    </p:spTree>
-    <p:custDataLst>
-      <p:tags r:id="rId1"/>
-    </p:custDataLst>
-    <p:extLst>
-      <p:ext uri="{BB962C8B-B14F-4D97-AF65-F5344CB8AC3E}">
-        <p14:creationId xmlns:p14="http://schemas.microsoft.com/office/powerpoint/2010/main" val="1027050507"/>
-      </p:ext>
-    </p:extLst>
-  </p:cSld>
-  <p:clrMapOvr>
-    <a:masterClrMapping/>
-  </p:clrMapOvr>
-</p:sld>
-</file>
-
-<file path=ppt/slides/slide36.xml><?xml version="1.0" encoding="utf-8"?>
-<p:sld xmlns:a="http://schemas.openxmlformats.org/drawingml/2006/main" xmlns:r="http://schemas.openxmlformats.org/officeDocument/2006/relationships" xmlns:p="http://schemas.openxmlformats.org/presentationml/2006/main">
-  <p:cSld>
-    <p:spTree>
-      <p:nvGrpSpPr>
-        <p:cNvPr id="1" name=""/>
-        <p:cNvGrpSpPr/>
-        <p:nvPr/>
-      </p:nvGrpSpPr>
-      <p:grpSpPr>
-        <a:xfrm>
-          <a:off x="0" y="0"/>
-          <a:ext cx="0" cy="0"/>
-          <a:chOff x="0" y="0"/>
-          <a:chExt cx="0" cy="0"/>
-        </a:xfrm>
-      </p:grpSpPr>
-    </p:spTree>
-    <p:custDataLst>
-      <p:tags r:id="rId1"/>
-    </p:custDataLst>
-  </p:cSld>
-  <p:clrMapOvr>
-    <a:masterClrMapping/>
-  </p:clrMapOvr>
-</p:sld>
-</file>
-
-<file path=ppt/slides/slide37.xml><?xml version="1.0" encoding="utf-8"?>
-<p:sld xmlns:a="http://schemas.openxmlformats.org/drawingml/2006/main" xmlns:r="http://schemas.openxmlformats.org/officeDocument/2006/relationships" xmlns:p="http://schemas.openxmlformats.org/presentationml/2006/main">
-  <p:cSld>
-    <p:spTree>
-      <p:nvGrpSpPr>
-        <p:cNvPr id="1" name=""/>
-        <p:cNvGrpSpPr/>
-        <p:nvPr/>
-      </p:nvGrpSpPr>
-      <p:grpSpPr>
-        <a:xfrm>
-          <a:off x="0" y="0"/>
-          <a:ext cx="0" cy="0"/>
-          <a:chOff x="0" y="0"/>
-          <a:chExt cx="0" cy="0"/>
-        </a:xfrm>
-      </p:grpSpPr>
-      <p:sp>
-        <p:nvSpPr>
-          <p:cNvPr id="2" name="文本占位符 1"/>
-          <p:cNvSpPr>
-            <a:spLocks noGrp="1"/>
-          </p:cNvSpPr>
-          <p:nvPr>
-            <p:ph type="body" idx="1"/>
-          </p:nvPr>
-        </p:nvSpPr>
-        <p:spPr/>
-        <p:txBody>
-          <a:bodyPr/>
-          <a:lstStyle/>
-          <a:p>
-            <a:pPr marL="285750" indent="-285750">
-              <a:buFont typeface="Arial" panose="020B0604020202020204" pitchFamily="34" charset="0"/>
-              <a:buChar char="•"/>
-            </a:pPr>
-            <a:endParaRPr lang="en-US" altLang="zh-CN" dirty="0"/>
-          </a:p>
-        </p:txBody>
-      </p:sp>
-      <p:sp>
-        <p:nvSpPr>
-          <p:cNvPr id="3" name="标题 2"/>
-          <p:cNvSpPr>
-            <a:spLocks noGrp="1"/>
-          </p:cNvSpPr>
-          <p:nvPr>
-            <p:ph type="title"/>
-          </p:nvPr>
-        </p:nvSpPr>
-        <p:spPr/>
-        <p:txBody>
-          <a:bodyPr/>
-          <a:lstStyle/>
-          <a:p>
-            <a:r>
               <a:rPr lang="zh-CN" altLang="en-US" dirty="0"/>
               <a:t>问答</a:t>
             </a:r>
@@ -18581,7 +20098,7 @@
 </p:sld>
 </file>
 
-<file path=ppt/slides/slide38.xml><?xml version="1.0" encoding="utf-8"?>
+<file path=ppt/slides/slide36.xml><?xml version="1.0" encoding="utf-8"?>
 <p:sld xmlns:a="http://schemas.openxmlformats.org/drawingml/2006/main" xmlns:r="http://schemas.openxmlformats.org/officeDocument/2006/relationships" xmlns:p="http://schemas.openxmlformats.org/presentationml/2006/main">
   <p:cSld>
     <p:spTree>
@@ -22320,24 +23837,6 @@
 </file>
 
 <file path=ppt/tags/tag105.xml><?xml version="1.0" encoding="utf-8"?>
-<p:tagLst xmlns:a="http://schemas.openxmlformats.org/drawingml/2006/main" xmlns:r="http://schemas.openxmlformats.org/officeDocument/2006/relationships" xmlns:p="http://schemas.openxmlformats.org/presentationml/2006/main">
-  <p:tag name="KSO_WM_BEAUTIFY_FLAG" val="#wm#"/>
-  <p:tag name="KSO_WM_TEMPLATE_CATEGORY" val="custom"/>
-  <p:tag name="KSO_WM_TEMPLATE_INDEX" val="20187308"/>
-  <p:tag name="KSO_WM_SPECIAL_SOURCE" val="bdnull"/>
-</p:tagLst>
-</file>
-
-<file path=ppt/tags/tag106.xml><?xml version="1.0" encoding="utf-8"?>
-<p:tagLst xmlns:a="http://schemas.openxmlformats.org/drawingml/2006/main" xmlns:r="http://schemas.openxmlformats.org/officeDocument/2006/relationships" xmlns:p="http://schemas.openxmlformats.org/presentationml/2006/main">
-  <p:tag name="KSO_WM_BEAUTIFY_FLAG" val="#wm#"/>
-  <p:tag name="KSO_WM_TEMPLATE_CATEGORY" val="custom"/>
-  <p:tag name="KSO_WM_TEMPLATE_INDEX" val="20187308"/>
-  <p:tag name="KSO_WM_SPECIAL_SOURCE" val="bdnull"/>
-</p:tagLst>
-</file>
-
-<file path=ppt/tags/tag107.xml><?xml version="1.0" encoding="utf-8"?>
 <p:tagLst xmlns:a="http://schemas.openxmlformats.org/drawingml/2006/main" xmlns:r="http://schemas.openxmlformats.org/officeDocument/2006/relationships" xmlns:p="http://schemas.openxmlformats.org/presentationml/2006/main">
   <p:tag name="KSO_WM_BEAUTIFY_FLAG" val="#wm#"/>
   <p:tag name="KSO_WM_TEMPLATE_CATEGORY" val="custom"/>

</xml_diff>